<commit_message>
flask about forms and input user
</commit_message>
<xml_diff>
--- a/Study/03. Forms and User Input/Forms and User Input.pptx
+++ b/Study/03. Forms and User Input/Forms and User Input.pptx
@@ -9,7 +9,13 @@
     <p:sldId id="284" r:id="rId3"/>
     <p:sldId id="293" r:id="rId4"/>
     <p:sldId id="294" r:id="rId5"/>
-    <p:sldId id="295" r:id="rId6"/>
+    <p:sldId id="296" r:id="rId6"/>
+    <p:sldId id="297" r:id="rId7"/>
+    <p:sldId id="295" r:id="rId8"/>
+    <p:sldId id="298" r:id="rId9"/>
+    <p:sldId id="299" r:id="rId10"/>
+    <p:sldId id="300" r:id="rId11"/>
+    <p:sldId id="301" r:id="rId12"/>
   </p:sldIdLst>
   <p:sldSz cx="12192000" cy="6858000"/>
   <p:notesSz cx="6858000" cy="9144000"/>
@@ -5902,6 +5908,1154 @@
 </p:sld>
 </file>
 
+<file path=ppt/slides/slide10.xml><?xml version="1.0" encoding="utf-8"?>
+<p:sld xmlns:a="http://schemas.openxmlformats.org/drawingml/2006/main" xmlns:r="http://schemas.openxmlformats.org/officeDocument/2006/relationships" xmlns:p="http://schemas.openxmlformats.org/presentationml/2006/main">
+  <p:cSld>
+    <p:spTree>
+      <p:nvGrpSpPr>
+        <p:cNvPr id="1" name=""/>
+        <p:cNvGrpSpPr/>
+        <p:nvPr/>
+      </p:nvGrpSpPr>
+      <p:grpSpPr>
+        <a:xfrm>
+          <a:off x="0" y="0"/>
+          <a:ext cx="0" cy="0"/>
+          <a:chOff x="0" y="0"/>
+          <a:chExt cx="0" cy="0"/>
+        </a:xfrm>
+      </p:grpSpPr>
+      <p:sp>
+        <p:nvSpPr>
+          <p:cNvPr id="2" name="제목 1">
+            <a:extLst>
+              <a:ext uri="{FF2B5EF4-FFF2-40B4-BE49-F238E27FC236}">
+                <a16:creationId xmlns:a16="http://schemas.microsoft.com/office/drawing/2014/main" id="{2EC833C6-FAC3-442B-803D-3FB02DF07980}"/>
+              </a:ext>
+            </a:extLst>
+          </p:cNvPr>
+          <p:cNvSpPr>
+            <a:spLocks noGrp="1"/>
+          </p:cNvSpPr>
+          <p:nvPr>
+            <p:ph type="title"/>
+          </p:nvPr>
+        </p:nvSpPr>
+        <p:spPr>
+          <a:xfrm>
+            <a:off x="677334" y="609600"/>
+            <a:ext cx="8596668" cy="517864"/>
+          </a:xfrm>
+        </p:spPr>
+        <p:txBody>
+          <a:bodyPr>
+            <a:normAutofit fontScale="90000"/>
+          </a:bodyPr>
+          <a:lstStyle/>
+          <a:p>
+            <a:r>
+              <a:rPr lang="en-US" altLang="ko-KR" dirty="0"/>
+              <a:t>3. Forms and User Input</a:t>
+            </a:r>
+            <a:endParaRPr lang="ko-KR" altLang="en-US" dirty="0"/>
+          </a:p>
+        </p:txBody>
+      </p:sp>
+      <p:sp>
+        <p:nvSpPr>
+          <p:cNvPr id="4" name="제목 1">
+            <a:extLst>
+              <a:ext uri="{FF2B5EF4-FFF2-40B4-BE49-F238E27FC236}">
+                <a16:creationId xmlns:a16="http://schemas.microsoft.com/office/drawing/2014/main" id="{824331F3-9831-4A24-AC95-4771B0BCE333}"/>
+              </a:ext>
+            </a:extLst>
+          </p:cNvPr>
+          <p:cNvSpPr txBox="1">
+            <a:spLocks/>
+          </p:cNvSpPr>
+          <p:nvPr/>
+        </p:nvSpPr>
+        <p:spPr>
+          <a:xfrm>
+            <a:off x="1307647" y="1180730"/>
+            <a:ext cx="8022783" cy="436518"/>
+          </a:xfrm>
+          <a:prstGeom prst="rect">
+            <a:avLst/>
+          </a:prstGeom>
+        </p:spPr>
+        <p:txBody>
+          <a:bodyPr vert="horz" lIns="91440" tIns="45720" rIns="91440" bIns="45720" rtlCol="0" anchor="t">
+            <a:normAutofit lnSpcReduction="10000"/>
+          </a:bodyPr>
+          <a:lstStyle>
+            <a:lvl1pPr algn="l" defTabSz="457200" rtl="0" eaLnBrk="1" latinLnBrk="1" hangingPunct="1">
+              <a:spcBef>
+                <a:spcPct val="0"/>
+              </a:spcBef>
+              <a:buNone/>
+              <a:defRPr sz="3600" kern="1200">
+                <a:solidFill>
+                  <a:schemeClr val="accent1"/>
+                </a:solidFill>
+                <a:latin typeface="+mj-lt"/>
+                <a:ea typeface="+mj-ea"/>
+                <a:cs typeface="+mj-cs"/>
+              </a:defRPr>
+            </a:lvl1pPr>
+            <a:lvl2pPr eaLnBrk="1" latinLnBrk="1" hangingPunct="1">
+              <a:defRPr>
+                <a:solidFill>
+                  <a:schemeClr val="tx2"/>
+                </a:solidFill>
+              </a:defRPr>
+            </a:lvl2pPr>
+            <a:lvl3pPr eaLnBrk="1" latinLnBrk="1" hangingPunct="1">
+              <a:defRPr>
+                <a:solidFill>
+                  <a:schemeClr val="tx2"/>
+                </a:solidFill>
+              </a:defRPr>
+            </a:lvl3pPr>
+            <a:lvl4pPr eaLnBrk="1" latinLnBrk="1" hangingPunct="1">
+              <a:defRPr>
+                <a:solidFill>
+                  <a:schemeClr val="tx2"/>
+                </a:solidFill>
+              </a:defRPr>
+            </a:lvl4pPr>
+            <a:lvl5pPr eaLnBrk="1" latinLnBrk="1" hangingPunct="1">
+              <a:defRPr>
+                <a:solidFill>
+                  <a:schemeClr val="tx2"/>
+                </a:solidFill>
+              </a:defRPr>
+            </a:lvl5pPr>
+            <a:lvl6pPr eaLnBrk="1" latinLnBrk="1" hangingPunct="1">
+              <a:defRPr>
+                <a:solidFill>
+                  <a:schemeClr val="tx2"/>
+                </a:solidFill>
+              </a:defRPr>
+            </a:lvl6pPr>
+            <a:lvl7pPr eaLnBrk="1" latinLnBrk="1" hangingPunct="1">
+              <a:defRPr>
+                <a:solidFill>
+                  <a:schemeClr val="tx2"/>
+                </a:solidFill>
+              </a:defRPr>
+            </a:lvl7pPr>
+            <a:lvl8pPr eaLnBrk="1" latinLnBrk="1" hangingPunct="1">
+              <a:defRPr>
+                <a:solidFill>
+                  <a:schemeClr val="tx2"/>
+                </a:solidFill>
+              </a:defRPr>
+            </a:lvl8pPr>
+            <a:lvl9pPr eaLnBrk="1" latinLnBrk="1" hangingPunct="1">
+              <a:defRPr>
+                <a:solidFill>
+                  <a:schemeClr val="tx2"/>
+                </a:solidFill>
+              </a:defRPr>
+            </a:lvl9pPr>
+          </a:lstStyle>
+          <a:p>
+            <a:r>
+              <a:rPr lang="en-US" altLang="ko-KR" sz="2400" dirty="0"/>
+              <a:t>Form</a:t>
+            </a:r>
+            <a:r>
+              <a:rPr lang="ko-KR" altLang="en-US" sz="2400" dirty="0"/>
+              <a:t> </a:t>
+            </a:r>
+            <a:r>
+              <a:rPr lang="en-US" altLang="ko-KR" sz="2400" dirty="0"/>
+              <a:t>Handling</a:t>
+            </a:r>
+            <a:r>
+              <a:rPr lang="ko-KR" altLang="en-US" sz="2400" dirty="0"/>
+              <a:t> </a:t>
+            </a:r>
+            <a:r>
+              <a:rPr lang="en-US" altLang="ko-KR" sz="2400" dirty="0"/>
+              <a:t>in</a:t>
+            </a:r>
+            <a:r>
+              <a:rPr lang="ko-KR" altLang="en-US" sz="2400" dirty="0"/>
+              <a:t> </a:t>
+            </a:r>
+            <a:r>
+              <a:rPr lang="en-US" altLang="ko-KR" sz="2400" dirty="0"/>
+              <a:t>View Functions</a:t>
+            </a:r>
+          </a:p>
+        </p:txBody>
+      </p:sp>
+      <p:sp>
+        <p:nvSpPr>
+          <p:cNvPr id="6" name="직사각형 5">
+            <a:extLst>
+              <a:ext uri="{FF2B5EF4-FFF2-40B4-BE49-F238E27FC236}">
+                <a16:creationId xmlns:a16="http://schemas.microsoft.com/office/drawing/2014/main" id="{6A60F032-B172-43E0-B147-16329887DE8F}"/>
+              </a:ext>
+            </a:extLst>
+          </p:cNvPr>
+          <p:cNvSpPr/>
+          <p:nvPr/>
+        </p:nvSpPr>
+        <p:spPr>
+          <a:xfrm>
+            <a:off x="7620874" y="2196693"/>
+            <a:ext cx="4470512" cy="3754874"/>
+          </a:xfrm>
+          <a:prstGeom prst="rect">
+            <a:avLst/>
+          </a:prstGeom>
+        </p:spPr>
+        <p:txBody>
+          <a:bodyPr wrap="square">
+            <a:spAutoFit/>
+          </a:bodyPr>
+          <a:lstStyle/>
+          <a:p>
+            <a:pPr marL="285750" indent="-285750">
+              <a:buFontTx/>
+              <a:buChar char="-"/>
+            </a:pPr>
+            <a:r>
+              <a:rPr lang="en-US" altLang="ko-KR" sz="1400" dirty="0" err="1"/>
+              <a:t>App.route</a:t>
+            </a:r>
+            <a:r>
+              <a:rPr lang="en-US" altLang="ko-KR" sz="1400" dirty="0"/>
+              <a:t> </a:t>
+            </a:r>
+            <a:r>
+              <a:rPr lang="ko-KR" altLang="en-US" sz="1400" dirty="0" err="1"/>
+              <a:t>데코레이터에</a:t>
+            </a:r>
+            <a:r>
+              <a:rPr lang="ko-KR" altLang="en-US" sz="1400" dirty="0"/>
+              <a:t> 추가된 </a:t>
+            </a:r>
+            <a:r>
+              <a:rPr lang="en-US" altLang="ko-KR" sz="1400" dirty="0"/>
+              <a:t>methods </a:t>
+            </a:r>
+            <a:r>
+              <a:rPr lang="ko-KR" altLang="en-US" sz="1400" dirty="0"/>
+              <a:t>인수는 </a:t>
+            </a:r>
+            <a:r>
+              <a:rPr lang="en-US" altLang="ko-KR" sz="1400" dirty="0"/>
+              <a:t>Flask </a:t>
+            </a:r>
+            <a:r>
+              <a:rPr lang="ko-KR" altLang="en-US" sz="1400" dirty="0"/>
+              <a:t>에서 </a:t>
+            </a:r>
+            <a:r>
+              <a:rPr lang="en-US" altLang="ko-KR" sz="1400" dirty="0" err="1"/>
+              <a:t>url</a:t>
+            </a:r>
+            <a:r>
+              <a:rPr lang="en-US" altLang="ko-KR" sz="1400" dirty="0"/>
+              <a:t> </a:t>
+            </a:r>
+            <a:r>
+              <a:rPr lang="ko-KR" altLang="en-US" sz="1400" dirty="0" err="1"/>
+              <a:t>맵의</a:t>
+            </a:r>
+            <a:r>
+              <a:rPr lang="ko-KR" altLang="en-US" sz="1400" dirty="0"/>
+              <a:t> </a:t>
+            </a:r>
+            <a:r>
+              <a:rPr lang="en-US" altLang="ko-KR" sz="1400" dirty="0"/>
+              <a:t>GET</a:t>
+            </a:r>
+            <a:r>
+              <a:rPr lang="ko-KR" altLang="en-US" sz="1400" dirty="0"/>
+              <a:t>과 </a:t>
+            </a:r>
+            <a:r>
+              <a:rPr lang="en-US" altLang="ko-KR" sz="1400" dirty="0"/>
+              <a:t>POST </a:t>
+            </a:r>
+            <a:r>
+              <a:rPr lang="ko-KR" altLang="en-US" sz="1400" dirty="0"/>
+              <a:t>를 </a:t>
+            </a:r>
+            <a:r>
+              <a:rPr lang="en-US" altLang="ko-KR" sz="1400" dirty="0"/>
+              <a:t>request </a:t>
+            </a:r>
+            <a:r>
+              <a:rPr lang="ko-KR" altLang="en-US" sz="1400" dirty="0"/>
+              <a:t>위한 </a:t>
+            </a:r>
+            <a:r>
+              <a:rPr lang="ko-KR" altLang="en-US" sz="1400" dirty="0" err="1"/>
+              <a:t>핸들러</a:t>
+            </a:r>
+            <a:r>
+              <a:rPr lang="ko-KR" altLang="en-US" sz="1400" dirty="0"/>
+              <a:t> </a:t>
+            </a:r>
+            <a:r>
+              <a:rPr lang="en-US" altLang="ko-KR" sz="1400" dirty="0"/>
+              <a:t>view </a:t>
+            </a:r>
+            <a:r>
+              <a:rPr lang="ko-KR" altLang="en-US" sz="1400" dirty="0"/>
+              <a:t>함수이다</a:t>
+            </a:r>
+            <a:r>
+              <a:rPr lang="en-US" altLang="ko-KR" sz="1400" dirty="0"/>
+              <a:t>.</a:t>
+            </a:r>
+          </a:p>
+          <a:p>
+            <a:pPr marL="285750" indent="-285750">
+              <a:buFontTx/>
+              <a:buChar char="-"/>
+            </a:pPr>
+            <a:r>
+              <a:rPr lang="ko-KR" altLang="en-US" sz="1400" dirty="0"/>
+              <a:t>메소드가 주어지지 않으면 </a:t>
+            </a:r>
+            <a:r>
+              <a:rPr lang="en-US" altLang="ko-KR" sz="1400" dirty="0"/>
+              <a:t>view</a:t>
+            </a:r>
+            <a:r>
+              <a:rPr lang="ko-KR" altLang="en-US" sz="1400" dirty="0"/>
+              <a:t>함수는 </a:t>
+            </a:r>
+            <a:r>
+              <a:rPr lang="en-US" altLang="ko-KR" sz="1400" dirty="0"/>
+              <a:t>GET request</a:t>
+            </a:r>
+            <a:r>
+              <a:rPr lang="ko-KR" altLang="en-US" sz="1400" dirty="0"/>
+              <a:t>만 처리</a:t>
+            </a:r>
+            <a:endParaRPr lang="en-US" altLang="ko-KR" sz="1400" dirty="0"/>
+          </a:p>
+          <a:p>
+            <a:pPr marL="285750" indent="-285750">
+              <a:buFontTx/>
+              <a:buChar char="-"/>
+            </a:pPr>
+            <a:r>
+              <a:rPr lang="en-US" altLang="ko-KR" sz="1400" dirty="0"/>
+              <a:t>Name</a:t>
+            </a:r>
+            <a:r>
+              <a:rPr lang="ko-KR" altLang="en-US" sz="1400" dirty="0"/>
+              <a:t> 변수는 </a:t>
+            </a:r>
+            <a:r>
+              <a:rPr lang="en-US" altLang="ko-KR" sz="1400" dirty="0"/>
+              <a:t>form</a:t>
+            </a:r>
+            <a:r>
+              <a:rPr lang="ko-KR" altLang="en-US" sz="1400" dirty="0"/>
+              <a:t>으로 부터 받은 이름을 저장</a:t>
+            </a:r>
+            <a:endParaRPr lang="en-US" altLang="ko-KR" sz="1400" dirty="0"/>
+          </a:p>
+          <a:p>
+            <a:pPr marL="285750" indent="-285750">
+              <a:buFontTx/>
+              <a:buChar char="-"/>
+            </a:pPr>
+            <a:r>
+              <a:rPr lang="en-US" altLang="ko-KR" sz="1400" dirty="0" err="1"/>
+              <a:t>Validate_on_submit</a:t>
+            </a:r>
+            <a:r>
+              <a:rPr lang="en-US" altLang="ko-KR" sz="1400" dirty="0"/>
+              <a:t>() </a:t>
+            </a:r>
+            <a:r>
+              <a:rPr lang="ko-KR" altLang="en-US" sz="1400" dirty="0"/>
+              <a:t>은 메서드의 폼이 </a:t>
+            </a:r>
+            <a:r>
+              <a:rPr lang="ko-KR" altLang="en-US" sz="1400" dirty="0" err="1"/>
+              <a:t>서브밋될때</a:t>
+            </a:r>
+            <a:r>
+              <a:rPr lang="ko-KR" altLang="en-US" sz="1400" dirty="0"/>
+              <a:t> </a:t>
+            </a:r>
+            <a:r>
+              <a:rPr lang="en-US" altLang="ko-KR" sz="1400" dirty="0"/>
+              <a:t>True</a:t>
+            </a:r>
+            <a:r>
+              <a:rPr lang="ko-KR" altLang="en-US" sz="1400" dirty="0"/>
+              <a:t>를 리턴하고 데이터는 모든 </a:t>
+            </a:r>
+            <a:r>
+              <a:rPr lang="en-US" altLang="ko-KR" sz="1400" dirty="0"/>
+              <a:t>field </a:t>
+            </a:r>
+            <a:r>
+              <a:rPr lang="ko-KR" altLang="en-US" sz="1400" dirty="0"/>
+              <a:t>검증자에 의해 받아들여진다</a:t>
+            </a:r>
+            <a:r>
+              <a:rPr lang="en-US" altLang="ko-KR" sz="1400" dirty="0"/>
+              <a:t>.(</a:t>
+            </a:r>
+            <a:r>
+              <a:rPr lang="ko-KR" altLang="en-US" sz="1400" dirty="0"/>
+              <a:t>유효성 검사</a:t>
+            </a:r>
+            <a:r>
+              <a:rPr lang="en-US" altLang="ko-KR" sz="1400" dirty="0"/>
+              <a:t>)</a:t>
+            </a:r>
+          </a:p>
+          <a:p>
+            <a:pPr marL="285750" indent="-285750">
+              <a:buFontTx/>
+              <a:buChar char="-"/>
+            </a:pPr>
+            <a:r>
+              <a:rPr lang="ko-KR" altLang="en-US" sz="1400" dirty="0"/>
+              <a:t>다른 경우에는 </a:t>
+            </a:r>
+            <a:r>
+              <a:rPr lang="en-US" altLang="ko-KR" sz="1400" dirty="0"/>
+              <a:t>False </a:t>
+            </a:r>
+            <a:r>
+              <a:rPr lang="ko-KR" altLang="en-US" sz="1400" dirty="0"/>
+              <a:t>반환</a:t>
+            </a:r>
+            <a:endParaRPr lang="en-US" altLang="ko-KR" sz="1400" dirty="0"/>
+          </a:p>
+          <a:p>
+            <a:pPr marL="285750" indent="-285750">
+              <a:buFontTx/>
+              <a:buChar char="-"/>
+            </a:pPr>
+            <a:endParaRPr lang="en-US" altLang="ko-KR" sz="1400" dirty="0"/>
+          </a:p>
+          <a:p>
+            <a:pPr marL="285750" indent="-285750">
+              <a:buFontTx/>
+              <a:buChar char="-"/>
+            </a:pPr>
+            <a:r>
+              <a:rPr lang="ko-KR" altLang="en-US" sz="1400" dirty="0"/>
+              <a:t>사용자가 폼을 제출할 때 데이터와 함께 서버는 </a:t>
+            </a:r>
+            <a:r>
+              <a:rPr lang="en-US" altLang="ko-KR" sz="1400" dirty="0"/>
+              <a:t>POST request</a:t>
+            </a:r>
+            <a:r>
+              <a:rPr lang="ko-KR" altLang="en-US" sz="1400" dirty="0"/>
+              <a:t>를 받고 </a:t>
+            </a:r>
+            <a:r>
+              <a:rPr lang="en-US" altLang="ko-KR" sz="1400" dirty="0" err="1"/>
+              <a:t>validate_on_submit</a:t>
+            </a:r>
+            <a:r>
+              <a:rPr lang="en-US" altLang="ko-KR" sz="1400" dirty="0"/>
+              <a:t>() </a:t>
+            </a:r>
+            <a:r>
+              <a:rPr lang="ko-KR" altLang="en-US" sz="1400" dirty="0"/>
+              <a:t>을 호출하면 </a:t>
+            </a:r>
+            <a:r>
+              <a:rPr lang="en-US" altLang="ko-KR" sz="1400" dirty="0"/>
+              <a:t>name </a:t>
+            </a:r>
+            <a:r>
+              <a:rPr lang="ko-KR" altLang="en-US" sz="1400" dirty="0"/>
+              <a:t>필드에 붙어 있는 </a:t>
+            </a:r>
+            <a:r>
+              <a:rPr lang="en-US" altLang="ko-KR" sz="1400" dirty="0"/>
+              <a:t>Required() </a:t>
+            </a:r>
+            <a:r>
+              <a:rPr lang="ko-KR" altLang="en-US" sz="1400" dirty="0"/>
+              <a:t>검증자가 호출</a:t>
+            </a:r>
+            <a:endParaRPr lang="en-US" altLang="ko-KR" sz="1400" dirty="0"/>
+          </a:p>
+          <a:p>
+            <a:pPr marL="285750" indent="-285750">
+              <a:buFontTx/>
+              <a:buChar char="-"/>
+            </a:pPr>
+            <a:r>
+              <a:rPr lang="en-US" altLang="ko-KR" sz="1400" dirty="0"/>
+              <a:t>Name</a:t>
+            </a:r>
+            <a:r>
+              <a:rPr lang="ko-KR" altLang="en-US" sz="1400" dirty="0"/>
+              <a:t>이 비어 있으면</a:t>
+            </a:r>
+            <a:r>
+              <a:rPr lang="en-US" altLang="ko-KR" sz="1400" dirty="0"/>
+              <a:t>, </a:t>
+            </a:r>
+            <a:r>
+              <a:rPr lang="ko-KR" altLang="en-US" sz="1400" dirty="0"/>
+              <a:t>검증자가 값을 받아 </a:t>
+            </a:r>
+            <a:r>
+              <a:rPr lang="en-US" altLang="ko-KR" sz="1400" dirty="0"/>
+              <a:t>True </a:t>
+            </a:r>
+            <a:r>
+              <a:rPr lang="ko-KR" altLang="en-US" sz="1400" dirty="0"/>
+              <a:t>반환</a:t>
+            </a:r>
+            <a:endParaRPr lang="en-US" altLang="ko-KR" sz="1400" dirty="0"/>
+          </a:p>
+        </p:txBody>
+      </p:sp>
+      <p:pic>
+        <p:nvPicPr>
+          <p:cNvPr id="5" name="그림 4">
+            <a:extLst>
+              <a:ext uri="{FF2B5EF4-FFF2-40B4-BE49-F238E27FC236}">
+                <a16:creationId xmlns:a16="http://schemas.microsoft.com/office/drawing/2014/main" id="{FDC6DD09-369E-45DC-B44D-527EBD4B2B36}"/>
+              </a:ext>
+            </a:extLst>
+          </p:cNvPr>
+          <p:cNvPicPr>
+            <a:picLocks noChangeAspect="1"/>
+          </p:cNvPicPr>
+          <p:nvPr/>
+        </p:nvPicPr>
+        <p:blipFill>
+          <a:blip r:embed="rId2"/>
+          <a:stretch>
+            <a:fillRect/>
+          </a:stretch>
+        </p:blipFill>
+        <p:spPr>
+          <a:xfrm>
+            <a:off x="507819" y="1913023"/>
+            <a:ext cx="6986995" cy="3158300"/>
+          </a:xfrm>
+          <a:prstGeom prst="rect">
+            <a:avLst/>
+          </a:prstGeom>
+        </p:spPr>
+      </p:pic>
+    </p:spTree>
+    <p:extLst>
+      <p:ext uri="{BB962C8B-B14F-4D97-AF65-F5344CB8AC3E}">
+        <p14:creationId xmlns:p14="http://schemas.microsoft.com/office/powerpoint/2010/main" val="3774428932"/>
+      </p:ext>
+    </p:extLst>
+  </p:cSld>
+  <p:clrMapOvr>
+    <a:masterClrMapping/>
+  </p:clrMapOvr>
+</p:sld>
+</file>
+
+<file path=ppt/slides/slide11.xml><?xml version="1.0" encoding="utf-8"?>
+<p:sld xmlns:a="http://schemas.openxmlformats.org/drawingml/2006/main" xmlns:r="http://schemas.openxmlformats.org/officeDocument/2006/relationships" xmlns:p="http://schemas.openxmlformats.org/presentationml/2006/main">
+  <p:cSld>
+    <p:spTree>
+      <p:nvGrpSpPr>
+        <p:cNvPr id="1" name=""/>
+        <p:cNvGrpSpPr/>
+        <p:nvPr/>
+      </p:nvGrpSpPr>
+      <p:grpSpPr>
+        <a:xfrm>
+          <a:off x="0" y="0"/>
+          <a:ext cx="0" cy="0"/>
+          <a:chOff x="0" y="0"/>
+          <a:chExt cx="0" cy="0"/>
+        </a:xfrm>
+      </p:grpSpPr>
+      <p:sp>
+        <p:nvSpPr>
+          <p:cNvPr id="2" name="제목 1">
+            <a:extLst>
+              <a:ext uri="{FF2B5EF4-FFF2-40B4-BE49-F238E27FC236}">
+                <a16:creationId xmlns:a16="http://schemas.microsoft.com/office/drawing/2014/main" id="{2EC833C6-FAC3-442B-803D-3FB02DF07980}"/>
+              </a:ext>
+            </a:extLst>
+          </p:cNvPr>
+          <p:cNvSpPr>
+            <a:spLocks noGrp="1"/>
+          </p:cNvSpPr>
+          <p:nvPr>
+            <p:ph type="title"/>
+          </p:nvPr>
+        </p:nvSpPr>
+        <p:spPr>
+          <a:xfrm>
+            <a:off x="677334" y="609600"/>
+            <a:ext cx="8596668" cy="517864"/>
+          </a:xfrm>
+        </p:spPr>
+        <p:txBody>
+          <a:bodyPr>
+            <a:normAutofit fontScale="90000"/>
+          </a:bodyPr>
+          <a:lstStyle/>
+          <a:p>
+            <a:r>
+              <a:rPr lang="en-US" altLang="ko-KR" dirty="0"/>
+              <a:t>3. Forms and User Input</a:t>
+            </a:r>
+            <a:endParaRPr lang="ko-KR" altLang="en-US" dirty="0"/>
+          </a:p>
+        </p:txBody>
+      </p:sp>
+      <p:sp>
+        <p:nvSpPr>
+          <p:cNvPr id="4" name="제목 1">
+            <a:extLst>
+              <a:ext uri="{FF2B5EF4-FFF2-40B4-BE49-F238E27FC236}">
+                <a16:creationId xmlns:a16="http://schemas.microsoft.com/office/drawing/2014/main" id="{824331F3-9831-4A24-AC95-4771B0BCE333}"/>
+              </a:ext>
+            </a:extLst>
+          </p:cNvPr>
+          <p:cNvSpPr txBox="1">
+            <a:spLocks/>
+          </p:cNvSpPr>
+          <p:nvPr/>
+        </p:nvSpPr>
+        <p:spPr>
+          <a:xfrm>
+            <a:off x="1307647" y="1180730"/>
+            <a:ext cx="8022783" cy="436518"/>
+          </a:xfrm>
+          <a:prstGeom prst="rect">
+            <a:avLst/>
+          </a:prstGeom>
+        </p:spPr>
+        <p:txBody>
+          <a:bodyPr vert="horz" lIns="91440" tIns="45720" rIns="91440" bIns="45720" rtlCol="0" anchor="t">
+            <a:normAutofit lnSpcReduction="10000"/>
+          </a:bodyPr>
+          <a:lstStyle>
+            <a:lvl1pPr algn="l" defTabSz="457200" rtl="0" eaLnBrk="1" latinLnBrk="1" hangingPunct="1">
+              <a:spcBef>
+                <a:spcPct val="0"/>
+              </a:spcBef>
+              <a:buNone/>
+              <a:defRPr sz="3600" kern="1200">
+                <a:solidFill>
+                  <a:schemeClr val="accent1"/>
+                </a:solidFill>
+                <a:latin typeface="+mj-lt"/>
+                <a:ea typeface="+mj-ea"/>
+                <a:cs typeface="+mj-cs"/>
+              </a:defRPr>
+            </a:lvl1pPr>
+            <a:lvl2pPr eaLnBrk="1" latinLnBrk="1" hangingPunct="1">
+              <a:defRPr>
+                <a:solidFill>
+                  <a:schemeClr val="tx2"/>
+                </a:solidFill>
+              </a:defRPr>
+            </a:lvl2pPr>
+            <a:lvl3pPr eaLnBrk="1" latinLnBrk="1" hangingPunct="1">
+              <a:defRPr>
+                <a:solidFill>
+                  <a:schemeClr val="tx2"/>
+                </a:solidFill>
+              </a:defRPr>
+            </a:lvl3pPr>
+            <a:lvl4pPr eaLnBrk="1" latinLnBrk="1" hangingPunct="1">
+              <a:defRPr>
+                <a:solidFill>
+                  <a:schemeClr val="tx2"/>
+                </a:solidFill>
+              </a:defRPr>
+            </a:lvl4pPr>
+            <a:lvl5pPr eaLnBrk="1" latinLnBrk="1" hangingPunct="1">
+              <a:defRPr>
+                <a:solidFill>
+                  <a:schemeClr val="tx2"/>
+                </a:solidFill>
+              </a:defRPr>
+            </a:lvl5pPr>
+            <a:lvl6pPr eaLnBrk="1" latinLnBrk="1" hangingPunct="1">
+              <a:defRPr>
+                <a:solidFill>
+                  <a:schemeClr val="tx2"/>
+                </a:solidFill>
+              </a:defRPr>
+            </a:lvl6pPr>
+            <a:lvl7pPr eaLnBrk="1" latinLnBrk="1" hangingPunct="1">
+              <a:defRPr>
+                <a:solidFill>
+                  <a:schemeClr val="tx2"/>
+                </a:solidFill>
+              </a:defRPr>
+            </a:lvl7pPr>
+            <a:lvl8pPr eaLnBrk="1" latinLnBrk="1" hangingPunct="1">
+              <a:defRPr>
+                <a:solidFill>
+                  <a:schemeClr val="tx2"/>
+                </a:solidFill>
+              </a:defRPr>
+            </a:lvl8pPr>
+            <a:lvl9pPr eaLnBrk="1" latinLnBrk="1" hangingPunct="1">
+              <a:defRPr>
+                <a:solidFill>
+                  <a:schemeClr val="tx2"/>
+                </a:solidFill>
+              </a:defRPr>
+            </a:lvl9pPr>
+          </a:lstStyle>
+          <a:p>
+            <a:r>
+              <a:rPr lang="en-US" altLang="ko-KR" sz="2400" dirty="0"/>
+              <a:t>Redirects and User Sessions</a:t>
+            </a:r>
+          </a:p>
+        </p:txBody>
+      </p:sp>
+      <p:sp>
+        <p:nvSpPr>
+          <p:cNvPr id="6" name="직사각형 5">
+            <a:extLst>
+              <a:ext uri="{FF2B5EF4-FFF2-40B4-BE49-F238E27FC236}">
+                <a16:creationId xmlns:a16="http://schemas.microsoft.com/office/drawing/2014/main" id="{6A60F032-B172-43E0-B147-16329887DE8F}"/>
+              </a:ext>
+            </a:extLst>
+          </p:cNvPr>
+          <p:cNvSpPr/>
+          <p:nvPr/>
+        </p:nvSpPr>
+        <p:spPr>
+          <a:xfrm>
+            <a:off x="7620874" y="2196693"/>
+            <a:ext cx="4470512" cy="3754874"/>
+          </a:xfrm>
+          <a:prstGeom prst="rect">
+            <a:avLst/>
+          </a:prstGeom>
+        </p:spPr>
+        <p:txBody>
+          <a:bodyPr wrap="square">
+            <a:spAutoFit/>
+          </a:bodyPr>
+          <a:lstStyle/>
+          <a:p>
+            <a:pPr marL="285750" indent="-285750">
+              <a:buFontTx/>
+              <a:buChar char="-"/>
+            </a:pPr>
+            <a:r>
+              <a:rPr lang="ko-KR" altLang="en-US" sz="1400" dirty="0"/>
+              <a:t>첫번째는 </a:t>
+            </a:r>
+            <a:r>
+              <a:rPr lang="en-US" altLang="ko-KR" sz="1400" dirty="0"/>
+              <a:t>form</a:t>
+            </a:r>
+            <a:r>
+              <a:rPr lang="ko-KR" altLang="en-US" sz="1400" dirty="0"/>
+              <a:t>의 작동 예시</a:t>
+            </a:r>
+            <a:endParaRPr lang="en-US" altLang="ko-KR" sz="1400" dirty="0"/>
+          </a:p>
+          <a:p>
+            <a:pPr marL="285750" indent="-285750">
+              <a:buFontTx/>
+              <a:buChar char="-"/>
+            </a:pPr>
+            <a:r>
+              <a:rPr lang="ko-KR" altLang="en-US" sz="1400" dirty="0"/>
+              <a:t>두번째는 새로운 이름을 제출한 상태</a:t>
+            </a:r>
+            <a:endParaRPr lang="en-US" altLang="ko-KR" sz="1400" dirty="0"/>
+          </a:p>
+          <a:p>
+            <a:pPr marL="285750" indent="-285750">
+              <a:buFontTx/>
+              <a:buChar char="-"/>
+            </a:pPr>
+            <a:r>
+              <a:rPr lang="ko-KR" altLang="en-US" sz="1400" dirty="0"/>
+              <a:t>세번째는 검증에 실패</a:t>
+            </a:r>
+            <a:endParaRPr lang="en-US" altLang="ko-KR" sz="1400" dirty="0"/>
+          </a:p>
+          <a:p>
+            <a:pPr marL="285750" indent="-285750">
+              <a:buFontTx/>
+              <a:buChar char="-"/>
+            </a:pPr>
+            <a:endParaRPr lang="en-US" altLang="ko-KR" sz="1400" dirty="0"/>
+          </a:p>
+          <a:p>
+            <a:pPr marL="285750" indent="-285750">
+              <a:buFontTx/>
+              <a:buChar char="-"/>
+            </a:pPr>
+            <a:r>
+              <a:rPr lang="ko-KR" altLang="en-US" sz="1400" dirty="0"/>
+              <a:t>폼을 제출하고 </a:t>
+            </a:r>
+            <a:r>
+              <a:rPr lang="ko-KR" altLang="en-US" sz="1400" dirty="0" err="1"/>
+              <a:t>새로고침을</a:t>
+            </a:r>
+            <a:r>
+              <a:rPr lang="ko-KR" altLang="en-US" sz="1400" dirty="0"/>
+              <a:t> 하면 제출이 또 일어나서 폼 서브미션이 두 번하게 되는 문제 발생</a:t>
+            </a:r>
+            <a:endParaRPr lang="en-US" altLang="ko-KR" sz="1400" dirty="0"/>
+          </a:p>
+          <a:p>
+            <a:pPr marL="285750" indent="-285750">
+              <a:buFontTx/>
+              <a:buChar char="-"/>
+            </a:pPr>
+            <a:r>
+              <a:rPr lang="ko-KR" altLang="en-US" sz="1400" dirty="0"/>
+              <a:t>마지막 </a:t>
+            </a:r>
+            <a:r>
+              <a:rPr lang="ko-KR" altLang="en-US" sz="1400" dirty="0" err="1"/>
+              <a:t>리퀘스트를</a:t>
+            </a:r>
+            <a:r>
+              <a:rPr lang="ko-KR" altLang="en-US" sz="1400" dirty="0"/>
+              <a:t> 반복해서 </a:t>
+            </a:r>
+            <a:r>
+              <a:rPr lang="en-US" altLang="ko-KR" sz="1400" dirty="0"/>
+              <a:t>POST </a:t>
+            </a:r>
+            <a:r>
+              <a:rPr lang="ko-KR" altLang="en-US" sz="1400" dirty="0" err="1"/>
+              <a:t>리퀘스트가</a:t>
+            </a:r>
+            <a:r>
+              <a:rPr lang="ko-KR" altLang="en-US" sz="1400" dirty="0"/>
+              <a:t> 다시 </a:t>
+            </a:r>
+            <a:r>
+              <a:rPr lang="ko-KR" altLang="en-US" sz="1400" dirty="0" err="1"/>
+              <a:t>전송되서</a:t>
+            </a:r>
+            <a:r>
+              <a:rPr lang="ko-KR" altLang="en-US" sz="1400" dirty="0"/>
+              <a:t> 생기는 문제</a:t>
+            </a:r>
+            <a:endParaRPr lang="en-US" altLang="ko-KR" sz="1400" dirty="0"/>
+          </a:p>
+          <a:p>
+            <a:pPr marL="285750" indent="-285750">
+              <a:buFontTx/>
+              <a:buChar char="-"/>
+            </a:pPr>
+            <a:r>
+              <a:rPr lang="ko-KR" altLang="en-US" sz="1400" dirty="0"/>
+              <a:t>정상적인 응답 대신 </a:t>
+            </a:r>
+            <a:r>
+              <a:rPr lang="en-US" altLang="ko-KR" sz="1400" dirty="0"/>
+              <a:t>redirect </a:t>
+            </a:r>
+            <a:r>
+              <a:rPr lang="ko-KR" altLang="en-US" sz="1400" dirty="0"/>
+              <a:t>와 </a:t>
+            </a:r>
+            <a:r>
+              <a:rPr lang="en-US" altLang="ko-KR" sz="1400" dirty="0"/>
+              <a:t>POST </a:t>
+            </a:r>
+            <a:r>
+              <a:rPr lang="ko-KR" altLang="en-US" sz="1400" dirty="0" err="1"/>
+              <a:t>리퀘스트에</a:t>
+            </a:r>
+            <a:r>
+              <a:rPr lang="ko-KR" altLang="en-US" sz="1400" dirty="0"/>
+              <a:t> 대해 응답하면 된다</a:t>
+            </a:r>
+            <a:r>
+              <a:rPr lang="en-US" altLang="ko-KR" sz="1400" dirty="0"/>
+              <a:t>.</a:t>
+            </a:r>
+          </a:p>
+          <a:p>
+            <a:pPr marL="285750" indent="-285750">
+              <a:buFontTx/>
+              <a:buChar char="-"/>
+            </a:pPr>
+            <a:r>
+              <a:rPr lang="en-US" altLang="ko-KR" sz="1400" dirty="0"/>
+              <a:t>Redirect</a:t>
+            </a:r>
+            <a:r>
+              <a:rPr lang="ko-KR" altLang="en-US" sz="1400" dirty="0"/>
+              <a:t>는 특별한 형태의 응답이고 </a:t>
+            </a:r>
+            <a:r>
+              <a:rPr lang="en-US" altLang="ko-KR" sz="1400" dirty="0"/>
+              <a:t>HTML </a:t>
+            </a:r>
+            <a:r>
+              <a:rPr lang="ko-KR" altLang="en-US" sz="1400" dirty="0"/>
+              <a:t>코드로 되어 있는 문자열 대신 </a:t>
+            </a:r>
+            <a:r>
+              <a:rPr lang="en-US" altLang="ko-KR" sz="1400" dirty="0"/>
+              <a:t>URL</a:t>
+            </a:r>
+            <a:r>
+              <a:rPr lang="ko-KR" altLang="en-US" sz="1400" dirty="0"/>
+              <a:t>을 가지고 있다</a:t>
+            </a:r>
+            <a:r>
+              <a:rPr lang="en-US" altLang="ko-KR" sz="1400" dirty="0"/>
+              <a:t>.</a:t>
+            </a:r>
+          </a:p>
+          <a:p>
+            <a:pPr marL="285750" indent="-285750">
+              <a:buFontTx/>
+              <a:buChar char="-"/>
+            </a:pPr>
+            <a:r>
+              <a:rPr lang="ko-KR" altLang="en-US" sz="1400" dirty="0"/>
+              <a:t>응답을 받게 되면 </a:t>
+            </a:r>
+            <a:r>
+              <a:rPr lang="ko-KR" altLang="en-US" sz="1400" dirty="0" err="1"/>
+              <a:t>리다이렉트</a:t>
+            </a:r>
+            <a:r>
+              <a:rPr lang="ko-KR" altLang="en-US" sz="1400" dirty="0"/>
+              <a:t> </a:t>
+            </a:r>
+            <a:r>
+              <a:rPr lang="en-US" altLang="ko-KR" sz="1400" dirty="0" err="1"/>
+              <a:t>url</a:t>
+            </a:r>
+            <a:r>
+              <a:rPr lang="ko-KR" altLang="en-US" sz="1400" dirty="0"/>
+              <a:t>에 대한 </a:t>
+            </a:r>
+            <a:r>
+              <a:rPr lang="en-US" altLang="ko-KR" sz="1400" dirty="0"/>
+              <a:t>GET </a:t>
+            </a:r>
+            <a:r>
+              <a:rPr lang="ko-KR" altLang="en-US" sz="1400" dirty="0" err="1"/>
+              <a:t>리퀘스트를</a:t>
+            </a:r>
+            <a:r>
+              <a:rPr lang="ko-KR" altLang="en-US" sz="1400" dirty="0"/>
+              <a:t> 발생 시키고 이것이 보여지는 페이지가 된다</a:t>
+            </a:r>
+            <a:r>
+              <a:rPr lang="en-US" altLang="ko-KR" sz="1400" dirty="0"/>
+              <a:t>.</a:t>
+            </a:r>
+          </a:p>
+          <a:p>
+            <a:pPr marL="285750" indent="-285750">
+              <a:buFontTx/>
+              <a:buChar char="-"/>
+            </a:pPr>
+            <a:r>
+              <a:rPr lang="ko-KR" altLang="en-US" sz="1400" dirty="0"/>
+              <a:t>이것이 </a:t>
+            </a:r>
+            <a:r>
+              <a:rPr lang="en-US" altLang="ko-KR" sz="1400" dirty="0"/>
+              <a:t>Post/Redirect/Get pattern </a:t>
+            </a:r>
+            <a:r>
+              <a:rPr lang="ko-KR" altLang="en-US" sz="1400" dirty="0"/>
+              <a:t>이다</a:t>
+            </a:r>
+            <a:r>
+              <a:rPr lang="en-US" altLang="ko-KR" sz="1400"/>
+              <a:t>.</a:t>
+            </a:r>
+          </a:p>
+          <a:p>
+            <a:pPr marL="285750" indent="-285750">
+              <a:buFontTx/>
+              <a:buChar char="-"/>
+            </a:pPr>
+            <a:endParaRPr lang="en-US" altLang="ko-KR" sz="1400" dirty="0"/>
+          </a:p>
+        </p:txBody>
+      </p:sp>
+      <p:pic>
+        <p:nvPicPr>
+          <p:cNvPr id="1026" name="Picture 2" descr="image">
+            <a:extLst>
+              <a:ext uri="{FF2B5EF4-FFF2-40B4-BE49-F238E27FC236}">
+                <a16:creationId xmlns:a16="http://schemas.microsoft.com/office/drawing/2014/main" id="{0B12C31F-15EE-4073-AD5B-BB97198FC8F3}"/>
+              </a:ext>
+            </a:extLst>
+          </p:cNvPr>
+          <p:cNvPicPr>
+            <a:picLocks noChangeAspect="1" noChangeArrowheads="1"/>
+          </p:cNvPicPr>
+          <p:nvPr/>
+        </p:nvPicPr>
+        <p:blipFill>
+          <a:blip r:embed="rId2">
+            <a:extLst>
+              <a:ext uri="{28A0092B-C50C-407E-A947-70E740481C1C}">
+                <a14:useLocalDpi xmlns:a14="http://schemas.microsoft.com/office/drawing/2010/main" val="0"/>
+              </a:ext>
+            </a:extLst>
+          </a:blip>
+          <a:srcRect/>
+          <a:stretch>
+            <a:fillRect/>
+          </a:stretch>
+        </p:blipFill>
+        <p:spPr bwMode="auto">
+          <a:xfrm>
+            <a:off x="48987" y="2237951"/>
+            <a:ext cx="2478779" cy="1841628"/>
+          </a:xfrm>
+          <a:prstGeom prst="rect">
+            <a:avLst/>
+          </a:prstGeom>
+          <a:noFill/>
+          <a:extLst>
+            <a:ext uri="{909E8E84-426E-40DD-AFC4-6F175D3DCCD1}">
+              <a14:hiddenFill xmlns:a14="http://schemas.microsoft.com/office/drawing/2010/main">
+                <a:solidFill>
+                  <a:srgbClr val="FFFFFF"/>
+                </a:solidFill>
+              </a14:hiddenFill>
+            </a:ext>
+          </a:extLst>
+        </p:spPr>
+      </p:pic>
+      <p:pic>
+        <p:nvPicPr>
+          <p:cNvPr id="1028" name="Picture 4" descr="image">
+            <a:extLst>
+              <a:ext uri="{FF2B5EF4-FFF2-40B4-BE49-F238E27FC236}">
+                <a16:creationId xmlns:a16="http://schemas.microsoft.com/office/drawing/2014/main" id="{5A6B5AB4-3B66-4E1D-8902-D3A10DB49F45}"/>
+              </a:ext>
+            </a:extLst>
+          </p:cNvPr>
+          <p:cNvPicPr>
+            <a:picLocks noChangeAspect="1" noChangeArrowheads="1"/>
+          </p:cNvPicPr>
+          <p:nvPr/>
+        </p:nvPicPr>
+        <p:blipFill>
+          <a:blip r:embed="rId3">
+            <a:extLst>
+              <a:ext uri="{28A0092B-C50C-407E-A947-70E740481C1C}">
+                <a14:useLocalDpi xmlns:a14="http://schemas.microsoft.com/office/drawing/2010/main" val="0"/>
+              </a:ext>
+            </a:extLst>
+          </a:blip>
+          <a:srcRect/>
+          <a:stretch>
+            <a:fillRect/>
+          </a:stretch>
+        </p:blipFill>
+        <p:spPr bwMode="auto">
+          <a:xfrm>
+            <a:off x="2645226" y="2232501"/>
+            <a:ext cx="2334985" cy="1847078"/>
+          </a:xfrm>
+          <a:prstGeom prst="rect">
+            <a:avLst/>
+          </a:prstGeom>
+          <a:noFill/>
+          <a:extLst>
+            <a:ext uri="{909E8E84-426E-40DD-AFC4-6F175D3DCCD1}">
+              <a14:hiddenFill xmlns:a14="http://schemas.microsoft.com/office/drawing/2010/main">
+                <a:solidFill>
+                  <a:srgbClr val="FFFFFF"/>
+                </a:solidFill>
+              </a14:hiddenFill>
+            </a:ext>
+          </a:extLst>
+        </p:spPr>
+      </p:pic>
+      <p:pic>
+        <p:nvPicPr>
+          <p:cNvPr id="1030" name="Picture 6" descr="image">
+            <a:extLst>
+              <a:ext uri="{FF2B5EF4-FFF2-40B4-BE49-F238E27FC236}">
+                <a16:creationId xmlns:a16="http://schemas.microsoft.com/office/drawing/2014/main" id="{EC4E017E-3172-40DF-B292-7E0DF853210A}"/>
+              </a:ext>
+            </a:extLst>
+          </p:cNvPr>
+          <p:cNvPicPr>
+            <a:picLocks noChangeAspect="1" noChangeArrowheads="1"/>
+          </p:cNvPicPr>
+          <p:nvPr/>
+        </p:nvPicPr>
+        <p:blipFill>
+          <a:blip r:embed="rId4">
+            <a:extLst>
+              <a:ext uri="{28A0092B-C50C-407E-A947-70E740481C1C}">
+                <a14:useLocalDpi xmlns:a14="http://schemas.microsoft.com/office/drawing/2010/main" val="0"/>
+              </a:ext>
+            </a:extLst>
+          </a:blip>
+          <a:srcRect/>
+          <a:stretch>
+            <a:fillRect/>
+          </a:stretch>
+        </p:blipFill>
+        <p:spPr bwMode="auto">
+          <a:xfrm>
+            <a:off x="5149376" y="2196693"/>
+            <a:ext cx="2149495" cy="1887155"/>
+          </a:xfrm>
+          <a:prstGeom prst="rect">
+            <a:avLst/>
+          </a:prstGeom>
+          <a:noFill/>
+          <a:extLst>
+            <a:ext uri="{909E8E84-426E-40DD-AFC4-6F175D3DCCD1}">
+              <a14:hiddenFill xmlns:a14="http://schemas.microsoft.com/office/drawing/2010/main">
+                <a:solidFill>
+                  <a:srgbClr val="FFFFFF"/>
+                </a:solidFill>
+              </a14:hiddenFill>
+            </a:ext>
+          </a:extLst>
+        </p:spPr>
+      </p:pic>
+    </p:spTree>
+    <p:extLst>
+      <p:ext uri="{BB962C8B-B14F-4D97-AF65-F5344CB8AC3E}">
+        <p14:creationId xmlns:p14="http://schemas.microsoft.com/office/powerpoint/2010/main" val="4188577066"/>
+      </p:ext>
+    </p:extLst>
+  </p:cSld>
+  <p:clrMapOvr>
+    <a:masterClrMapping/>
+  </p:clrMapOvr>
+</p:sld>
+</file>
+
 <file path=ppt/slides/slide2.xml><?xml version="1.0" encoding="utf-8"?>
 <p:sld xmlns:a="http://schemas.openxmlformats.org/drawingml/2006/main" xmlns:r="http://schemas.openxmlformats.org/officeDocument/2006/relationships" xmlns:p="http://schemas.openxmlformats.org/presentationml/2006/main">
   <p:cSld>
@@ -6955,6 +8109,958 @@
           </a:lstStyle>
           <a:p>
             <a:r>
+              <a:rPr lang="en-US" altLang="ko-KR" sz="2400" dirty="0" err="1"/>
+              <a:t>WTForms</a:t>
+            </a:r>
+            <a:r>
+              <a:rPr lang="ko-KR" altLang="en-US" sz="2400" dirty="0"/>
+              <a:t> </a:t>
+            </a:r>
+            <a:r>
+              <a:rPr lang="en-US" altLang="ko-KR" sz="2400" dirty="0"/>
+              <a:t>standard</a:t>
+            </a:r>
+            <a:r>
+              <a:rPr lang="ko-KR" altLang="en-US" sz="2400" dirty="0"/>
+              <a:t> </a:t>
+            </a:r>
+            <a:r>
+              <a:rPr lang="en-US" altLang="ko-KR" sz="2400" dirty="0"/>
+              <a:t>HTML</a:t>
+            </a:r>
+            <a:r>
+              <a:rPr lang="ko-KR" altLang="en-US" sz="2400" dirty="0"/>
+              <a:t> </a:t>
+            </a:r>
+            <a:r>
+              <a:rPr lang="en-US" altLang="ko-KR" sz="2400" dirty="0"/>
+              <a:t>fields</a:t>
+            </a:r>
+          </a:p>
+        </p:txBody>
+      </p:sp>
+      <p:sp>
+        <p:nvSpPr>
+          <p:cNvPr id="6" name="직사각형 5">
+            <a:extLst>
+              <a:ext uri="{FF2B5EF4-FFF2-40B4-BE49-F238E27FC236}">
+                <a16:creationId xmlns:a16="http://schemas.microsoft.com/office/drawing/2014/main" id="{6A60F032-B172-43E0-B147-16329887DE8F}"/>
+              </a:ext>
+            </a:extLst>
+          </p:cNvPr>
+          <p:cNvSpPr/>
+          <p:nvPr/>
+        </p:nvSpPr>
+        <p:spPr>
+          <a:xfrm>
+            <a:off x="7620874" y="2196693"/>
+            <a:ext cx="4470512" cy="3754874"/>
+          </a:xfrm>
+          <a:prstGeom prst="rect">
+            <a:avLst/>
+          </a:prstGeom>
+        </p:spPr>
+        <p:txBody>
+          <a:bodyPr wrap="square">
+            <a:spAutoFit/>
+          </a:bodyPr>
+          <a:lstStyle/>
+          <a:p>
+            <a:pPr marL="285750" indent="-285750">
+              <a:buFontTx/>
+              <a:buChar char="-"/>
+            </a:pPr>
+            <a:r>
+              <a:rPr lang="ko-KR" altLang="en-US" sz="1400" dirty="0"/>
+              <a:t>브라우저에서 전송되는 </a:t>
+            </a:r>
+            <a:r>
+              <a:rPr lang="en-US" altLang="ko-KR" sz="1400" dirty="0"/>
+              <a:t>form data</a:t>
+            </a:r>
+            <a:r>
+              <a:rPr lang="ko-KR" altLang="en-US" sz="1400" dirty="0"/>
+              <a:t>를 가지고 작업을 </a:t>
+            </a:r>
+            <a:r>
+              <a:rPr lang="ko-KR" altLang="en-US" sz="1400" dirty="0" err="1"/>
+              <a:t>해야할</a:t>
+            </a:r>
+            <a:r>
+              <a:rPr lang="ko-KR" altLang="en-US" sz="1400" dirty="0"/>
+              <a:t> 때</a:t>
+            </a:r>
+            <a:r>
+              <a:rPr lang="en-US" altLang="ko-KR" sz="1400" dirty="0"/>
+              <a:t>, view code</a:t>
+            </a:r>
+            <a:r>
+              <a:rPr lang="ko-KR" altLang="en-US" sz="1400" dirty="0"/>
+              <a:t>를 읽기가 매우 </a:t>
+            </a:r>
+            <a:r>
+              <a:rPr lang="ko-KR" altLang="en-US" sz="1400" dirty="0" err="1"/>
+              <a:t>어려짐</a:t>
+            </a:r>
+            <a:r>
+              <a:rPr lang="en-US" altLang="ko-KR" sz="1400" dirty="0"/>
+              <a:t>.</a:t>
+            </a:r>
+          </a:p>
+          <a:p>
+            <a:pPr marL="285750" indent="-285750">
+              <a:buFontTx/>
+              <a:buChar char="-"/>
+            </a:pPr>
+            <a:r>
+              <a:rPr lang="ko-KR" altLang="en-US" sz="1400" dirty="0"/>
+              <a:t>이 과정을 더 쉽게 관리할 수 있도록 설계된 라이브러리가 있는데 그것이 </a:t>
+            </a:r>
+            <a:r>
+              <a:rPr lang="en-US" altLang="ko-KR" sz="1400" dirty="0" err="1"/>
+              <a:t>WTForms</a:t>
+            </a:r>
+            <a:r>
+              <a:rPr lang="en-US" altLang="ko-KR" sz="1400" dirty="0"/>
+              <a:t> </a:t>
+            </a:r>
+            <a:r>
+              <a:rPr lang="ko-KR" altLang="en-US" sz="1400" dirty="0"/>
+              <a:t>다</a:t>
+            </a:r>
+            <a:r>
+              <a:rPr lang="en-US" altLang="ko-KR" sz="1400" dirty="0"/>
+              <a:t>.</a:t>
+            </a:r>
+          </a:p>
+          <a:p>
+            <a:pPr marL="285750" indent="-285750">
+              <a:buFontTx/>
+              <a:buChar char="-"/>
+            </a:pPr>
+            <a:r>
+              <a:rPr lang="en-US" altLang="ko-KR" sz="1400" dirty="0" err="1"/>
+              <a:t>WTForms</a:t>
+            </a:r>
+            <a:r>
+              <a:rPr lang="ko-KR" altLang="en-US" sz="1400" dirty="0"/>
+              <a:t>로 작업 </a:t>
+            </a:r>
+            <a:r>
+              <a:rPr lang="ko-KR" altLang="en-US" sz="1400" dirty="0" err="1"/>
+              <a:t>할때는</a:t>
+            </a:r>
+            <a:r>
+              <a:rPr lang="ko-KR" altLang="en-US" sz="1400" dirty="0"/>
+              <a:t> 먼저 </a:t>
+            </a:r>
+            <a:r>
+              <a:rPr lang="en-US" altLang="ko-KR" sz="1400" dirty="0"/>
+              <a:t>class</a:t>
+            </a:r>
+            <a:r>
+              <a:rPr lang="ko-KR" altLang="en-US" sz="1400" dirty="0"/>
+              <a:t>로 그 </a:t>
+            </a:r>
+            <a:r>
+              <a:rPr lang="en-US" altLang="ko-KR" sz="1400" dirty="0"/>
+              <a:t>form</a:t>
+            </a:r>
+            <a:r>
+              <a:rPr lang="ko-KR" altLang="en-US" sz="1400" dirty="0"/>
+              <a:t>들을 정의해야 한다</a:t>
+            </a:r>
+            <a:r>
+              <a:rPr lang="en-US" altLang="ko-KR" sz="1400" dirty="0"/>
+              <a:t>.</a:t>
+            </a:r>
+          </a:p>
+          <a:p>
+            <a:pPr marL="285750" indent="-285750">
+              <a:buFontTx/>
+              <a:buChar char="-"/>
+            </a:pPr>
+            <a:r>
+              <a:rPr lang="ko-KR" altLang="en-US" sz="1400" dirty="0"/>
+              <a:t>어플리케이션을 여러 모듈로 쪼개고 </a:t>
+            </a:r>
+            <a:r>
+              <a:rPr lang="en-US" altLang="ko-KR" sz="1400" dirty="0"/>
+              <a:t>form</a:t>
+            </a:r>
+            <a:r>
+              <a:rPr lang="ko-KR" altLang="en-US" sz="1400" dirty="0"/>
+              <a:t>에 대한 분리된 모듈을 추가하는 것이 권고된다</a:t>
+            </a:r>
+            <a:r>
+              <a:rPr lang="en-US" altLang="ko-KR" sz="1400" dirty="0"/>
+              <a:t>.</a:t>
+            </a:r>
+          </a:p>
+          <a:p>
+            <a:pPr marL="285750" indent="-285750">
+              <a:buFontTx/>
+              <a:buChar char="-"/>
+            </a:pPr>
+            <a:endParaRPr lang="en-US" altLang="ko-KR" sz="1400" dirty="0"/>
+          </a:p>
+          <a:p>
+            <a:pPr marL="285750" indent="-285750">
+              <a:buFontTx/>
+              <a:buChar char="-"/>
+            </a:pPr>
+            <a:r>
+              <a:rPr lang="ko-KR" altLang="en-US" sz="1400" dirty="0"/>
+              <a:t>위의 코드가 전형적인 </a:t>
+            </a:r>
+            <a:r>
+              <a:rPr lang="en-US" altLang="ko-KR" sz="1400" dirty="0"/>
+              <a:t>form </a:t>
+            </a:r>
+            <a:r>
+              <a:rPr lang="ko-KR" altLang="en-US" sz="1400" dirty="0"/>
+              <a:t>예제</a:t>
+            </a:r>
+            <a:endParaRPr lang="en-US" altLang="ko-KR" sz="1400" dirty="0"/>
+          </a:p>
+          <a:p>
+            <a:pPr marL="285750" indent="-285750">
+              <a:buFontTx/>
+              <a:buChar char="-"/>
+            </a:pPr>
+            <a:endParaRPr lang="en-US" altLang="ko-KR" sz="1400" dirty="0"/>
+          </a:p>
+          <a:p>
+            <a:pPr marL="285750" indent="-285750">
+              <a:buFontTx/>
+              <a:buChar char="-"/>
+            </a:pPr>
+            <a:r>
+              <a:rPr lang="en-US" altLang="ko-KR" sz="1400" dirty="0"/>
+              <a:t>Form</a:t>
+            </a:r>
+            <a:r>
+              <a:rPr lang="ko-KR" altLang="en-US" sz="1400" dirty="0"/>
+              <a:t>에 맞는 것을 사용</a:t>
+            </a:r>
+            <a:endParaRPr lang="en-US" altLang="ko-KR" sz="1400" dirty="0"/>
+          </a:p>
+          <a:p>
+            <a:pPr marL="285750" indent="-285750">
+              <a:buFontTx/>
+              <a:buChar char="-"/>
+            </a:pPr>
+            <a:r>
+              <a:rPr lang="en-US" altLang="ko-KR" sz="1400" dirty="0" err="1"/>
+              <a:t>StringField</a:t>
+            </a:r>
+            <a:endParaRPr lang="en-US" altLang="ko-KR" sz="1400" dirty="0"/>
+          </a:p>
+          <a:p>
+            <a:pPr marL="285750" indent="-285750">
+              <a:buFontTx/>
+              <a:buChar char="-"/>
+            </a:pPr>
+            <a:r>
+              <a:rPr lang="en-US" altLang="ko-KR" sz="1400" dirty="0" err="1"/>
+              <a:t>PasswordField</a:t>
+            </a:r>
+            <a:endParaRPr lang="en-US" altLang="ko-KR" sz="1400" dirty="0"/>
+          </a:p>
+          <a:p>
+            <a:pPr marL="285750" indent="-285750">
+              <a:buFontTx/>
+              <a:buChar char="-"/>
+            </a:pPr>
+            <a:r>
+              <a:rPr lang="en-US" altLang="ko-KR" sz="1400" dirty="0" err="1"/>
+              <a:t>SubmitField</a:t>
+            </a:r>
+            <a:endParaRPr lang="en-US" altLang="ko-KR" sz="1400" dirty="0"/>
+          </a:p>
+          <a:p>
+            <a:pPr marL="285750" indent="-285750">
+              <a:buFontTx/>
+              <a:buChar char="-"/>
+            </a:pPr>
+            <a:r>
+              <a:rPr lang="en-US" altLang="ko-KR" sz="1400" dirty="0" err="1"/>
+              <a:t>BooleanField</a:t>
+            </a:r>
+            <a:endParaRPr lang="en-US" altLang="ko-KR" sz="1400" dirty="0"/>
+          </a:p>
+          <a:p>
+            <a:pPr marL="285750" indent="-285750">
+              <a:buFontTx/>
+              <a:buChar char="-"/>
+            </a:pPr>
+            <a:endParaRPr lang="en-US" altLang="ko-KR" sz="1400" dirty="0"/>
+          </a:p>
+        </p:txBody>
+      </p:sp>
+      <p:pic>
+        <p:nvPicPr>
+          <p:cNvPr id="3" name="그림 2">
+            <a:extLst>
+              <a:ext uri="{FF2B5EF4-FFF2-40B4-BE49-F238E27FC236}">
+                <a16:creationId xmlns:a16="http://schemas.microsoft.com/office/drawing/2014/main" id="{352C2449-9DB4-49A0-A914-99B0B2667B71}"/>
+              </a:ext>
+            </a:extLst>
+          </p:cNvPr>
+          <p:cNvPicPr>
+            <a:picLocks noChangeAspect="1"/>
+          </p:cNvPicPr>
+          <p:nvPr/>
+        </p:nvPicPr>
+        <p:blipFill>
+          <a:blip r:embed="rId2"/>
+          <a:stretch>
+            <a:fillRect/>
+          </a:stretch>
+        </p:blipFill>
+        <p:spPr>
+          <a:xfrm>
+            <a:off x="1507600" y="1712962"/>
+            <a:ext cx="5170787" cy="5047965"/>
+          </a:xfrm>
+          <a:prstGeom prst="rect">
+            <a:avLst/>
+          </a:prstGeom>
+        </p:spPr>
+      </p:pic>
+    </p:spTree>
+    <p:extLst>
+      <p:ext uri="{BB962C8B-B14F-4D97-AF65-F5344CB8AC3E}">
+        <p14:creationId xmlns:p14="http://schemas.microsoft.com/office/powerpoint/2010/main" val="729960550"/>
+      </p:ext>
+    </p:extLst>
+  </p:cSld>
+  <p:clrMapOvr>
+    <a:masterClrMapping/>
+  </p:clrMapOvr>
+</p:sld>
+</file>
+
+<file path=ppt/slides/slide6.xml><?xml version="1.0" encoding="utf-8"?>
+<p:sld xmlns:a="http://schemas.openxmlformats.org/drawingml/2006/main" xmlns:r="http://schemas.openxmlformats.org/officeDocument/2006/relationships" xmlns:p="http://schemas.openxmlformats.org/presentationml/2006/main">
+  <p:cSld>
+    <p:spTree>
+      <p:nvGrpSpPr>
+        <p:cNvPr id="1" name=""/>
+        <p:cNvGrpSpPr/>
+        <p:nvPr/>
+      </p:nvGrpSpPr>
+      <p:grpSpPr>
+        <a:xfrm>
+          <a:off x="0" y="0"/>
+          <a:ext cx="0" cy="0"/>
+          <a:chOff x="0" y="0"/>
+          <a:chExt cx="0" cy="0"/>
+        </a:xfrm>
+      </p:grpSpPr>
+      <p:sp>
+        <p:nvSpPr>
+          <p:cNvPr id="2" name="제목 1">
+            <a:extLst>
+              <a:ext uri="{FF2B5EF4-FFF2-40B4-BE49-F238E27FC236}">
+                <a16:creationId xmlns:a16="http://schemas.microsoft.com/office/drawing/2014/main" id="{2EC833C6-FAC3-442B-803D-3FB02DF07980}"/>
+              </a:ext>
+            </a:extLst>
+          </p:cNvPr>
+          <p:cNvSpPr>
+            <a:spLocks noGrp="1"/>
+          </p:cNvSpPr>
+          <p:nvPr>
+            <p:ph type="title"/>
+          </p:nvPr>
+        </p:nvSpPr>
+        <p:spPr>
+          <a:xfrm>
+            <a:off x="677334" y="609600"/>
+            <a:ext cx="8596668" cy="517864"/>
+          </a:xfrm>
+        </p:spPr>
+        <p:txBody>
+          <a:bodyPr>
+            <a:normAutofit fontScale="90000"/>
+          </a:bodyPr>
+          <a:lstStyle/>
+          <a:p>
+            <a:r>
+              <a:rPr lang="en-US" altLang="ko-KR" dirty="0"/>
+              <a:t>3. Forms and User Input</a:t>
+            </a:r>
+            <a:endParaRPr lang="ko-KR" altLang="en-US" dirty="0"/>
+          </a:p>
+        </p:txBody>
+      </p:sp>
+      <p:sp>
+        <p:nvSpPr>
+          <p:cNvPr id="4" name="제목 1">
+            <a:extLst>
+              <a:ext uri="{FF2B5EF4-FFF2-40B4-BE49-F238E27FC236}">
+                <a16:creationId xmlns:a16="http://schemas.microsoft.com/office/drawing/2014/main" id="{824331F3-9831-4A24-AC95-4771B0BCE333}"/>
+              </a:ext>
+            </a:extLst>
+          </p:cNvPr>
+          <p:cNvSpPr txBox="1">
+            <a:spLocks/>
+          </p:cNvSpPr>
+          <p:nvPr/>
+        </p:nvSpPr>
+        <p:spPr>
+          <a:xfrm>
+            <a:off x="1307647" y="1180730"/>
+            <a:ext cx="8022783" cy="436518"/>
+          </a:xfrm>
+          <a:prstGeom prst="rect">
+            <a:avLst/>
+          </a:prstGeom>
+        </p:spPr>
+        <p:txBody>
+          <a:bodyPr vert="horz" lIns="91440" tIns="45720" rIns="91440" bIns="45720" rtlCol="0" anchor="t">
+            <a:normAutofit lnSpcReduction="10000"/>
+          </a:bodyPr>
+          <a:lstStyle>
+            <a:lvl1pPr algn="l" defTabSz="457200" rtl="0" eaLnBrk="1" latinLnBrk="1" hangingPunct="1">
+              <a:spcBef>
+                <a:spcPct val="0"/>
+              </a:spcBef>
+              <a:buNone/>
+              <a:defRPr sz="3600" kern="1200">
+                <a:solidFill>
+                  <a:schemeClr val="accent1"/>
+                </a:solidFill>
+                <a:latin typeface="+mj-lt"/>
+                <a:ea typeface="+mj-ea"/>
+                <a:cs typeface="+mj-cs"/>
+              </a:defRPr>
+            </a:lvl1pPr>
+            <a:lvl2pPr eaLnBrk="1" latinLnBrk="1" hangingPunct="1">
+              <a:defRPr>
+                <a:solidFill>
+                  <a:schemeClr val="tx2"/>
+                </a:solidFill>
+              </a:defRPr>
+            </a:lvl2pPr>
+            <a:lvl3pPr eaLnBrk="1" latinLnBrk="1" hangingPunct="1">
+              <a:defRPr>
+                <a:solidFill>
+                  <a:schemeClr val="tx2"/>
+                </a:solidFill>
+              </a:defRPr>
+            </a:lvl3pPr>
+            <a:lvl4pPr eaLnBrk="1" latinLnBrk="1" hangingPunct="1">
+              <a:defRPr>
+                <a:solidFill>
+                  <a:schemeClr val="tx2"/>
+                </a:solidFill>
+              </a:defRPr>
+            </a:lvl4pPr>
+            <a:lvl5pPr eaLnBrk="1" latinLnBrk="1" hangingPunct="1">
+              <a:defRPr>
+                <a:solidFill>
+                  <a:schemeClr val="tx2"/>
+                </a:solidFill>
+              </a:defRPr>
+            </a:lvl5pPr>
+            <a:lvl6pPr eaLnBrk="1" latinLnBrk="1" hangingPunct="1">
+              <a:defRPr>
+                <a:solidFill>
+                  <a:schemeClr val="tx2"/>
+                </a:solidFill>
+              </a:defRPr>
+            </a:lvl6pPr>
+            <a:lvl7pPr eaLnBrk="1" latinLnBrk="1" hangingPunct="1">
+              <a:defRPr>
+                <a:solidFill>
+                  <a:schemeClr val="tx2"/>
+                </a:solidFill>
+              </a:defRPr>
+            </a:lvl7pPr>
+            <a:lvl8pPr eaLnBrk="1" latinLnBrk="1" hangingPunct="1">
+              <a:defRPr>
+                <a:solidFill>
+                  <a:schemeClr val="tx2"/>
+                </a:solidFill>
+              </a:defRPr>
+            </a:lvl8pPr>
+            <a:lvl9pPr eaLnBrk="1" latinLnBrk="1" hangingPunct="1">
+              <a:defRPr>
+                <a:solidFill>
+                  <a:schemeClr val="tx2"/>
+                </a:solidFill>
+              </a:defRPr>
+            </a:lvl9pPr>
+          </a:lstStyle>
+          <a:p>
+            <a:r>
+              <a:rPr lang="en-US" altLang="ko-KR" sz="2400" dirty="0" err="1"/>
+              <a:t>WTForms</a:t>
+            </a:r>
+            <a:r>
+              <a:rPr lang="en-US" altLang="ko-KR" sz="2400" dirty="0"/>
+              <a:t> Validator</a:t>
+            </a:r>
+          </a:p>
+        </p:txBody>
+      </p:sp>
+      <p:sp>
+        <p:nvSpPr>
+          <p:cNvPr id="6" name="직사각형 5">
+            <a:extLst>
+              <a:ext uri="{FF2B5EF4-FFF2-40B4-BE49-F238E27FC236}">
+                <a16:creationId xmlns:a16="http://schemas.microsoft.com/office/drawing/2014/main" id="{6A60F032-B172-43E0-B147-16329887DE8F}"/>
+              </a:ext>
+            </a:extLst>
+          </p:cNvPr>
+          <p:cNvSpPr/>
+          <p:nvPr/>
+        </p:nvSpPr>
+        <p:spPr>
+          <a:xfrm>
+            <a:off x="7620874" y="2196693"/>
+            <a:ext cx="4470512" cy="3754874"/>
+          </a:xfrm>
+          <a:prstGeom prst="rect">
+            <a:avLst/>
+          </a:prstGeom>
+        </p:spPr>
+        <p:txBody>
+          <a:bodyPr wrap="square">
+            <a:spAutoFit/>
+          </a:bodyPr>
+          <a:lstStyle/>
+          <a:p>
+            <a:pPr marL="285750" indent="-285750">
+              <a:buFontTx/>
+              <a:buChar char="-"/>
+            </a:pPr>
+            <a:r>
+              <a:rPr lang="ko-KR" altLang="en-US" sz="1400" dirty="0"/>
+              <a:t>브라우저에서 전송되는 </a:t>
+            </a:r>
+            <a:r>
+              <a:rPr lang="en-US" altLang="ko-KR" sz="1400" dirty="0"/>
+              <a:t>form data</a:t>
+            </a:r>
+            <a:r>
+              <a:rPr lang="ko-KR" altLang="en-US" sz="1400" dirty="0"/>
+              <a:t>를 가지고 작업을 </a:t>
+            </a:r>
+            <a:r>
+              <a:rPr lang="ko-KR" altLang="en-US" sz="1400" dirty="0" err="1"/>
+              <a:t>해야할</a:t>
+            </a:r>
+            <a:r>
+              <a:rPr lang="ko-KR" altLang="en-US" sz="1400" dirty="0"/>
+              <a:t> 때</a:t>
+            </a:r>
+            <a:r>
+              <a:rPr lang="en-US" altLang="ko-KR" sz="1400" dirty="0"/>
+              <a:t>, view code</a:t>
+            </a:r>
+            <a:r>
+              <a:rPr lang="ko-KR" altLang="en-US" sz="1400" dirty="0"/>
+              <a:t>를 읽기가 매우 </a:t>
+            </a:r>
+            <a:r>
+              <a:rPr lang="ko-KR" altLang="en-US" sz="1400" dirty="0" err="1"/>
+              <a:t>어려짐</a:t>
+            </a:r>
+            <a:r>
+              <a:rPr lang="en-US" altLang="ko-KR" sz="1400" dirty="0"/>
+              <a:t>.</a:t>
+            </a:r>
+          </a:p>
+          <a:p>
+            <a:pPr marL="285750" indent="-285750">
+              <a:buFontTx/>
+              <a:buChar char="-"/>
+            </a:pPr>
+            <a:r>
+              <a:rPr lang="ko-KR" altLang="en-US" sz="1400" dirty="0"/>
+              <a:t>이 과정을 더 쉽게 관리할 수 있도록 설계된 라이브러리가 있는데 그것이 </a:t>
+            </a:r>
+            <a:r>
+              <a:rPr lang="en-US" altLang="ko-KR" sz="1400" dirty="0" err="1"/>
+              <a:t>WTForms</a:t>
+            </a:r>
+            <a:r>
+              <a:rPr lang="en-US" altLang="ko-KR" sz="1400" dirty="0"/>
+              <a:t> </a:t>
+            </a:r>
+            <a:r>
+              <a:rPr lang="ko-KR" altLang="en-US" sz="1400" dirty="0"/>
+              <a:t>다</a:t>
+            </a:r>
+            <a:r>
+              <a:rPr lang="en-US" altLang="ko-KR" sz="1400" dirty="0"/>
+              <a:t>.</a:t>
+            </a:r>
+          </a:p>
+          <a:p>
+            <a:pPr marL="285750" indent="-285750">
+              <a:buFontTx/>
+              <a:buChar char="-"/>
+            </a:pPr>
+            <a:r>
+              <a:rPr lang="en-US" altLang="ko-KR" sz="1400" dirty="0" err="1"/>
+              <a:t>WTForms</a:t>
+            </a:r>
+            <a:r>
+              <a:rPr lang="ko-KR" altLang="en-US" sz="1400" dirty="0"/>
+              <a:t>로 작업 </a:t>
+            </a:r>
+            <a:r>
+              <a:rPr lang="ko-KR" altLang="en-US" sz="1400" dirty="0" err="1"/>
+              <a:t>할때는</a:t>
+            </a:r>
+            <a:r>
+              <a:rPr lang="ko-KR" altLang="en-US" sz="1400" dirty="0"/>
+              <a:t> 먼저 </a:t>
+            </a:r>
+            <a:r>
+              <a:rPr lang="en-US" altLang="ko-KR" sz="1400" dirty="0"/>
+              <a:t>class</a:t>
+            </a:r>
+            <a:r>
+              <a:rPr lang="ko-KR" altLang="en-US" sz="1400" dirty="0"/>
+              <a:t>로 그 </a:t>
+            </a:r>
+            <a:r>
+              <a:rPr lang="en-US" altLang="ko-KR" sz="1400" dirty="0"/>
+              <a:t>form</a:t>
+            </a:r>
+            <a:r>
+              <a:rPr lang="ko-KR" altLang="en-US" sz="1400" dirty="0"/>
+              <a:t>들을 정의해야 한다</a:t>
+            </a:r>
+            <a:r>
+              <a:rPr lang="en-US" altLang="ko-KR" sz="1400" dirty="0"/>
+              <a:t>.</a:t>
+            </a:r>
+          </a:p>
+          <a:p>
+            <a:pPr marL="285750" indent="-285750">
+              <a:buFontTx/>
+              <a:buChar char="-"/>
+            </a:pPr>
+            <a:r>
+              <a:rPr lang="ko-KR" altLang="en-US" sz="1400" dirty="0"/>
+              <a:t>어플리케이션을 여러 모듈로 쪼개고 </a:t>
+            </a:r>
+            <a:r>
+              <a:rPr lang="en-US" altLang="ko-KR" sz="1400" dirty="0"/>
+              <a:t>form</a:t>
+            </a:r>
+            <a:r>
+              <a:rPr lang="ko-KR" altLang="en-US" sz="1400" dirty="0"/>
+              <a:t>에 대한 분리된 모듈을 추가하는 것이 권고된다</a:t>
+            </a:r>
+            <a:r>
+              <a:rPr lang="en-US" altLang="ko-KR" sz="1400" dirty="0"/>
+              <a:t>.</a:t>
+            </a:r>
+          </a:p>
+          <a:p>
+            <a:pPr marL="285750" indent="-285750">
+              <a:buFontTx/>
+              <a:buChar char="-"/>
+            </a:pPr>
+            <a:endParaRPr lang="en-US" altLang="ko-KR" sz="1400" dirty="0"/>
+          </a:p>
+          <a:p>
+            <a:pPr marL="285750" indent="-285750">
+              <a:buFontTx/>
+              <a:buChar char="-"/>
+            </a:pPr>
+            <a:r>
+              <a:rPr lang="ko-KR" altLang="en-US" sz="1400" dirty="0"/>
+              <a:t>위의 코드가 전형적인 </a:t>
+            </a:r>
+            <a:r>
+              <a:rPr lang="en-US" altLang="ko-KR" sz="1400" dirty="0"/>
+              <a:t>form </a:t>
+            </a:r>
+            <a:r>
+              <a:rPr lang="ko-KR" altLang="en-US" sz="1400" dirty="0"/>
+              <a:t>예제</a:t>
+            </a:r>
+            <a:endParaRPr lang="en-US" altLang="ko-KR" sz="1400" dirty="0"/>
+          </a:p>
+          <a:p>
+            <a:pPr marL="285750" indent="-285750">
+              <a:buFontTx/>
+              <a:buChar char="-"/>
+            </a:pPr>
+            <a:endParaRPr lang="en-US" altLang="ko-KR" sz="1400" dirty="0"/>
+          </a:p>
+          <a:p>
+            <a:pPr marL="285750" indent="-285750">
+              <a:buFontTx/>
+              <a:buChar char="-"/>
+            </a:pPr>
+            <a:r>
+              <a:rPr lang="en-US" altLang="ko-KR" sz="1400" dirty="0"/>
+              <a:t>Form</a:t>
+            </a:r>
+            <a:r>
+              <a:rPr lang="ko-KR" altLang="en-US" sz="1400" dirty="0"/>
+              <a:t>에 맞는 것을 사용</a:t>
+            </a:r>
+            <a:endParaRPr lang="en-US" altLang="ko-KR" sz="1400" dirty="0"/>
+          </a:p>
+          <a:p>
+            <a:pPr marL="285750" indent="-285750">
+              <a:buFontTx/>
+              <a:buChar char="-"/>
+            </a:pPr>
+            <a:r>
+              <a:rPr lang="en-US" altLang="ko-KR" sz="1400" dirty="0" err="1"/>
+              <a:t>StringField</a:t>
+            </a:r>
+            <a:endParaRPr lang="en-US" altLang="ko-KR" sz="1400" dirty="0"/>
+          </a:p>
+          <a:p>
+            <a:pPr marL="285750" indent="-285750">
+              <a:buFontTx/>
+              <a:buChar char="-"/>
+            </a:pPr>
+            <a:r>
+              <a:rPr lang="en-US" altLang="ko-KR" sz="1400" dirty="0" err="1"/>
+              <a:t>PasswordField</a:t>
+            </a:r>
+            <a:endParaRPr lang="en-US" altLang="ko-KR" sz="1400" dirty="0"/>
+          </a:p>
+          <a:p>
+            <a:pPr marL="285750" indent="-285750">
+              <a:buFontTx/>
+              <a:buChar char="-"/>
+            </a:pPr>
+            <a:r>
+              <a:rPr lang="en-US" altLang="ko-KR" sz="1400" dirty="0" err="1"/>
+              <a:t>SubmitField</a:t>
+            </a:r>
+            <a:endParaRPr lang="en-US" altLang="ko-KR" sz="1400" dirty="0"/>
+          </a:p>
+          <a:p>
+            <a:pPr marL="285750" indent="-285750">
+              <a:buFontTx/>
+              <a:buChar char="-"/>
+            </a:pPr>
+            <a:r>
+              <a:rPr lang="en-US" altLang="ko-KR" sz="1400" dirty="0" err="1"/>
+              <a:t>BooleanField</a:t>
+            </a:r>
+            <a:endParaRPr lang="en-US" altLang="ko-KR" sz="1400" dirty="0"/>
+          </a:p>
+          <a:p>
+            <a:pPr marL="285750" indent="-285750">
+              <a:buFontTx/>
+              <a:buChar char="-"/>
+            </a:pPr>
+            <a:endParaRPr lang="en-US" altLang="ko-KR" sz="1400" dirty="0"/>
+          </a:p>
+        </p:txBody>
+      </p:sp>
+      <p:pic>
+        <p:nvPicPr>
+          <p:cNvPr id="5" name="그림 4">
+            <a:extLst>
+              <a:ext uri="{FF2B5EF4-FFF2-40B4-BE49-F238E27FC236}">
+                <a16:creationId xmlns:a16="http://schemas.microsoft.com/office/drawing/2014/main" id="{766B28D3-2C05-43A6-9806-8A328D94057C}"/>
+              </a:ext>
+            </a:extLst>
+          </p:cNvPr>
+          <p:cNvPicPr>
+            <a:picLocks noChangeAspect="1"/>
+          </p:cNvPicPr>
+          <p:nvPr/>
+        </p:nvPicPr>
+        <p:blipFill>
+          <a:blip r:embed="rId2"/>
+          <a:stretch>
+            <a:fillRect/>
+          </a:stretch>
+        </p:blipFill>
+        <p:spPr>
+          <a:xfrm>
+            <a:off x="893385" y="2145893"/>
+            <a:ext cx="6539607" cy="3483176"/>
+          </a:xfrm>
+          <a:prstGeom prst="rect">
+            <a:avLst/>
+          </a:prstGeom>
+        </p:spPr>
+      </p:pic>
+    </p:spTree>
+    <p:extLst>
+      <p:ext uri="{BB962C8B-B14F-4D97-AF65-F5344CB8AC3E}">
+        <p14:creationId xmlns:p14="http://schemas.microsoft.com/office/powerpoint/2010/main" val="1528351578"/>
+      </p:ext>
+    </p:extLst>
+  </p:cSld>
+  <p:clrMapOvr>
+    <a:masterClrMapping/>
+  </p:clrMapOvr>
+</p:sld>
+</file>
+
+<file path=ppt/slides/slide7.xml><?xml version="1.0" encoding="utf-8"?>
+<p:sld xmlns:a="http://schemas.openxmlformats.org/drawingml/2006/main" xmlns:r="http://schemas.openxmlformats.org/officeDocument/2006/relationships" xmlns:p="http://schemas.openxmlformats.org/presentationml/2006/main">
+  <p:cSld>
+    <p:spTree>
+      <p:nvGrpSpPr>
+        <p:cNvPr id="1" name=""/>
+        <p:cNvGrpSpPr/>
+        <p:nvPr/>
+      </p:nvGrpSpPr>
+      <p:grpSpPr>
+        <a:xfrm>
+          <a:off x="0" y="0"/>
+          <a:ext cx="0" cy="0"/>
+          <a:chOff x="0" y="0"/>
+          <a:chExt cx="0" cy="0"/>
+        </a:xfrm>
+      </p:grpSpPr>
+      <p:sp>
+        <p:nvSpPr>
+          <p:cNvPr id="2" name="제목 1">
+            <a:extLst>
+              <a:ext uri="{FF2B5EF4-FFF2-40B4-BE49-F238E27FC236}">
+                <a16:creationId xmlns:a16="http://schemas.microsoft.com/office/drawing/2014/main" id="{2EC833C6-FAC3-442B-803D-3FB02DF07980}"/>
+              </a:ext>
+            </a:extLst>
+          </p:cNvPr>
+          <p:cNvSpPr>
+            <a:spLocks noGrp="1"/>
+          </p:cNvSpPr>
+          <p:nvPr>
+            <p:ph type="title"/>
+          </p:nvPr>
+        </p:nvSpPr>
+        <p:spPr>
+          <a:xfrm>
+            <a:off x="677334" y="609600"/>
+            <a:ext cx="8596668" cy="517864"/>
+          </a:xfrm>
+        </p:spPr>
+        <p:txBody>
+          <a:bodyPr>
+            <a:normAutofit fontScale="90000"/>
+          </a:bodyPr>
+          <a:lstStyle/>
+          <a:p>
+            <a:r>
+              <a:rPr lang="en-US" altLang="ko-KR" dirty="0"/>
+              <a:t>3. Forms and User Input</a:t>
+            </a:r>
+            <a:endParaRPr lang="ko-KR" altLang="en-US" dirty="0"/>
+          </a:p>
+        </p:txBody>
+      </p:sp>
+      <p:sp>
+        <p:nvSpPr>
+          <p:cNvPr id="4" name="제목 1">
+            <a:extLst>
+              <a:ext uri="{FF2B5EF4-FFF2-40B4-BE49-F238E27FC236}">
+                <a16:creationId xmlns:a16="http://schemas.microsoft.com/office/drawing/2014/main" id="{824331F3-9831-4A24-AC95-4771B0BCE333}"/>
+              </a:ext>
+            </a:extLst>
+          </p:cNvPr>
+          <p:cNvSpPr txBox="1">
+            <a:spLocks/>
+          </p:cNvSpPr>
+          <p:nvPr/>
+        </p:nvSpPr>
+        <p:spPr>
+          <a:xfrm>
+            <a:off x="1307647" y="1180730"/>
+            <a:ext cx="8022783" cy="436518"/>
+          </a:xfrm>
+          <a:prstGeom prst="rect">
+            <a:avLst/>
+          </a:prstGeom>
+        </p:spPr>
+        <p:txBody>
+          <a:bodyPr vert="horz" lIns="91440" tIns="45720" rIns="91440" bIns="45720" rtlCol="0" anchor="t">
+            <a:normAutofit lnSpcReduction="10000"/>
+          </a:bodyPr>
+          <a:lstStyle>
+            <a:lvl1pPr algn="l" defTabSz="457200" rtl="0" eaLnBrk="1" latinLnBrk="1" hangingPunct="1">
+              <a:spcBef>
+                <a:spcPct val="0"/>
+              </a:spcBef>
+              <a:buNone/>
+              <a:defRPr sz="3600" kern="1200">
+                <a:solidFill>
+                  <a:schemeClr val="accent1"/>
+                </a:solidFill>
+                <a:latin typeface="+mj-lt"/>
+                <a:ea typeface="+mj-ea"/>
+                <a:cs typeface="+mj-cs"/>
+              </a:defRPr>
+            </a:lvl1pPr>
+            <a:lvl2pPr eaLnBrk="1" latinLnBrk="1" hangingPunct="1">
+              <a:defRPr>
+                <a:solidFill>
+                  <a:schemeClr val="tx2"/>
+                </a:solidFill>
+              </a:defRPr>
+            </a:lvl2pPr>
+            <a:lvl3pPr eaLnBrk="1" latinLnBrk="1" hangingPunct="1">
+              <a:defRPr>
+                <a:solidFill>
+                  <a:schemeClr val="tx2"/>
+                </a:solidFill>
+              </a:defRPr>
+            </a:lvl3pPr>
+            <a:lvl4pPr eaLnBrk="1" latinLnBrk="1" hangingPunct="1">
+              <a:defRPr>
+                <a:solidFill>
+                  <a:schemeClr val="tx2"/>
+                </a:solidFill>
+              </a:defRPr>
+            </a:lvl4pPr>
+            <a:lvl5pPr eaLnBrk="1" latinLnBrk="1" hangingPunct="1">
+              <a:defRPr>
+                <a:solidFill>
+                  <a:schemeClr val="tx2"/>
+                </a:solidFill>
+              </a:defRPr>
+            </a:lvl5pPr>
+            <a:lvl6pPr eaLnBrk="1" latinLnBrk="1" hangingPunct="1">
+              <a:defRPr>
+                <a:solidFill>
+                  <a:schemeClr val="tx2"/>
+                </a:solidFill>
+              </a:defRPr>
+            </a:lvl6pPr>
+            <a:lvl7pPr eaLnBrk="1" latinLnBrk="1" hangingPunct="1">
+              <a:defRPr>
+                <a:solidFill>
+                  <a:schemeClr val="tx2"/>
+                </a:solidFill>
+              </a:defRPr>
+            </a:lvl7pPr>
+            <a:lvl8pPr eaLnBrk="1" latinLnBrk="1" hangingPunct="1">
+              <a:defRPr>
+                <a:solidFill>
+                  <a:schemeClr val="tx2"/>
+                </a:solidFill>
+              </a:defRPr>
+            </a:lvl8pPr>
+            <a:lvl9pPr eaLnBrk="1" latinLnBrk="1" hangingPunct="1">
+              <a:defRPr>
+                <a:solidFill>
+                  <a:schemeClr val="tx2"/>
+                </a:solidFill>
+              </a:defRPr>
+            </a:lvl9pPr>
+          </a:lstStyle>
+          <a:p>
+            <a:r>
               <a:rPr lang="en-US" altLang="ko-KR" sz="2400" dirty="0"/>
               <a:t>In the view</a:t>
             </a:r>
@@ -7181,6 +9287,961 @@
     <p:extLst>
       <p:ext uri="{BB962C8B-B14F-4D97-AF65-F5344CB8AC3E}">
         <p14:creationId xmlns:p14="http://schemas.microsoft.com/office/powerpoint/2010/main" val="2791102259"/>
+      </p:ext>
+    </p:extLst>
+  </p:cSld>
+  <p:clrMapOvr>
+    <a:masterClrMapping/>
+  </p:clrMapOvr>
+</p:sld>
+</file>
+
+<file path=ppt/slides/slide8.xml><?xml version="1.0" encoding="utf-8"?>
+<p:sld xmlns:a="http://schemas.openxmlformats.org/drawingml/2006/main" xmlns:r="http://schemas.openxmlformats.org/officeDocument/2006/relationships" xmlns:p="http://schemas.openxmlformats.org/presentationml/2006/main">
+  <p:cSld>
+    <p:spTree>
+      <p:nvGrpSpPr>
+        <p:cNvPr id="1" name=""/>
+        <p:cNvGrpSpPr/>
+        <p:nvPr/>
+      </p:nvGrpSpPr>
+      <p:grpSpPr>
+        <a:xfrm>
+          <a:off x="0" y="0"/>
+          <a:ext cx="0" cy="0"/>
+          <a:chOff x="0" y="0"/>
+          <a:chExt cx="0" cy="0"/>
+        </a:xfrm>
+      </p:grpSpPr>
+      <p:sp>
+        <p:nvSpPr>
+          <p:cNvPr id="2" name="제목 1">
+            <a:extLst>
+              <a:ext uri="{FF2B5EF4-FFF2-40B4-BE49-F238E27FC236}">
+                <a16:creationId xmlns:a16="http://schemas.microsoft.com/office/drawing/2014/main" id="{2EC833C6-FAC3-442B-803D-3FB02DF07980}"/>
+              </a:ext>
+            </a:extLst>
+          </p:cNvPr>
+          <p:cNvSpPr>
+            <a:spLocks noGrp="1"/>
+          </p:cNvSpPr>
+          <p:nvPr>
+            <p:ph type="title"/>
+          </p:nvPr>
+        </p:nvSpPr>
+        <p:spPr>
+          <a:xfrm>
+            <a:off x="677334" y="609600"/>
+            <a:ext cx="8596668" cy="517864"/>
+          </a:xfrm>
+        </p:spPr>
+        <p:txBody>
+          <a:bodyPr>
+            <a:normAutofit fontScale="90000"/>
+          </a:bodyPr>
+          <a:lstStyle/>
+          <a:p>
+            <a:r>
+              <a:rPr lang="en-US" altLang="ko-KR" dirty="0"/>
+              <a:t>3. Forms and User Input</a:t>
+            </a:r>
+            <a:endParaRPr lang="ko-KR" altLang="en-US" dirty="0"/>
+          </a:p>
+        </p:txBody>
+      </p:sp>
+      <p:sp>
+        <p:nvSpPr>
+          <p:cNvPr id="4" name="제목 1">
+            <a:extLst>
+              <a:ext uri="{FF2B5EF4-FFF2-40B4-BE49-F238E27FC236}">
+                <a16:creationId xmlns:a16="http://schemas.microsoft.com/office/drawing/2014/main" id="{824331F3-9831-4A24-AC95-4771B0BCE333}"/>
+              </a:ext>
+            </a:extLst>
+          </p:cNvPr>
+          <p:cNvSpPr txBox="1">
+            <a:spLocks/>
+          </p:cNvSpPr>
+          <p:nvPr/>
+        </p:nvSpPr>
+        <p:spPr>
+          <a:xfrm>
+            <a:off x="1307647" y="1180730"/>
+            <a:ext cx="8022783" cy="436518"/>
+          </a:xfrm>
+          <a:prstGeom prst="rect">
+            <a:avLst/>
+          </a:prstGeom>
+        </p:spPr>
+        <p:txBody>
+          <a:bodyPr vert="horz" lIns="91440" tIns="45720" rIns="91440" bIns="45720" rtlCol="0" anchor="t">
+            <a:normAutofit lnSpcReduction="10000"/>
+          </a:bodyPr>
+          <a:lstStyle>
+            <a:lvl1pPr algn="l" defTabSz="457200" rtl="0" eaLnBrk="1" latinLnBrk="1" hangingPunct="1">
+              <a:spcBef>
+                <a:spcPct val="0"/>
+              </a:spcBef>
+              <a:buNone/>
+              <a:defRPr sz="3600" kern="1200">
+                <a:solidFill>
+                  <a:schemeClr val="accent1"/>
+                </a:solidFill>
+                <a:latin typeface="+mj-lt"/>
+                <a:ea typeface="+mj-ea"/>
+                <a:cs typeface="+mj-cs"/>
+              </a:defRPr>
+            </a:lvl1pPr>
+            <a:lvl2pPr eaLnBrk="1" latinLnBrk="1" hangingPunct="1">
+              <a:defRPr>
+                <a:solidFill>
+                  <a:schemeClr val="tx2"/>
+                </a:solidFill>
+              </a:defRPr>
+            </a:lvl2pPr>
+            <a:lvl3pPr eaLnBrk="1" latinLnBrk="1" hangingPunct="1">
+              <a:defRPr>
+                <a:solidFill>
+                  <a:schemeClr val="tx2"/>
+                </a:solidFill>
+              </a:defRPr>
+            </a:lvl3pPr>
+            <a:lvl4pPr eaLnBrk="1" latinLnBrk="1" hangingPunct="1">
+              <a:defRPr>
+                <a:solidFill>
+                  <a:schemeClr val="tx2"/>
+                </a:solidFill>
+              </a:defRPr>
+            </a:lvl4pPr>
+            <a:lvl5pPr eaLnBrk="1" latinLnBrk="1" hangingPunct="1">
+              <a:defRPr>
+                <a:solidFill>
+                  <a:schemeClr val="tx2"/>
+                </a:solidFill>
+              </a:defRPr>
+            </a:lvl5pPr>
+            <a:lvl6pPr eaLnBrk="1" latinLnBrk="1" hangingPunct="1">
+              <a:defRPr>
+                <a:solidFill>
+                  <a:schemeClr val="tx2"/>
+                </a:solidFill>
+              </a:defRPr>
+            </a:lvl6pPr>
+            <a:lvl7pPr eaLnBrk="1" latinLnBrk="1" hangingPunct="1">
+              <a:defRPr>
+                <a:solidFill>
+                  <a:schemeClr val="tx2"/>
+                </a:solidFill>
+              </a:defRPr>
+            </a:lvl7pPr>
+            <a:lvl8pPr eaLnBrk="1" latinLnBrk="1" hangingPunct="1">
+              <a:defRPr>
+                <a:solidFill>
+                  <a:schemeClr val="tx2"/>
+                </a:solidFill>
+              </a:defRPr>
+            </a:lvl8pPr>
+            <a:lvl9pPr eaLnBrk="1" latinLnBrk="1" hangingPunct="1">
+              <a:defRPr>
+                <a:solidFill>
+                  <a:schemeClr val="tx2"/>
+                </a:solidFill>
+              </a:defRPr>
+            </a:lvl9pPr>
+          </a:lstStyle>
+          <a:p>
+            <a:r>
+              <a:rPr lang="en-US" altLang="ko-KR" sz="2400" dirty="0"/>
+              <a:t>HTML Rendering of Forms</a:t>
+            </a:r>
+          </a:p>
+        </p:txBody>
+      </p:sp>
+      <p:sp>
+        <p:nvSpPr>
+          <p:cNvPr id="6" name="직사각형 5">
+            <a:extLst>
+              <a:ext uri="{FF2B5EF4-FFF2-40B4-BE49-F238E27FC236}">
+                <a16:creationId xmlns:a16="http://schemas.microsoft.com/office/drawing/2014/main" id="{6A60F032-B172-43E0-B147-16329887DE8F}"/>
+              </a:ext>
+            </a:extLst>
+          </p:cNvPr>
+          <p:cNvSpPr/>
+          <p:nvPr/>
+        </p:nvSpPr>
+        <p:spPr>
+          <a:xfrm>
+            <a:off x="7620874" y="2196693"/>
+            <a:ext cx="4470512" cy="4616648"/>
+          </a:xfrm>
+          <a:prstGeom prst="rect">
+            <a:avLst/>
+          </a:prstGeom>
+        </p:spPr>
+        <p:txBody>
+          <a:bodyPr wrap="square">
+            <a:spAutoFit/>
+          </a:bodyPr>
+          <a:lstStyle/>
+          <a:p>
+            <a:pPr marL="285750" indent="-285750">
+              <a:buFontTx/>
+              <a:buChar char="-"/>
+            </a:pPr>
+            <a:r>
+              <a:rPr lang="en-US" altLang="ko-KR" sz="1400" dirty="0"/>
+              <a:t>Form field </a:t>
+            </a:r>
+            <a:r>
+              <a:rPr lang="ko-KR" altLang="en-US" sz="1400" dirty="0"/>
+              <a:t>는 호출 가능</a:t>
+            </a:r>
+            <a:endParaRPr lang="en-US" altLang="ko-KR" sz="1400" dirty="0"/>
+          </a:p>
+          <a:p>
+            <a:pPr marL="285750" indent="-285750">
+              <a:buFontTx/>
+              <a:buChar char="-"/>
+            </a:pPr>
+            <a:r>
+              <a:rPr lang="en-US" altLang="ko-KR" sz="1400" dirty="0"/>
+              <a:t>Form field</a:t>
+            </a:r>
+            <a:r>
+              <a:rPr lang="ko-KR" altLang="en-US" sz="1400" dirty="0"/>
+              <a:t> 가 호출되면 </a:t>
+            </a:r>
+            <a:r>
+              <a:rPr lang="en-US" altLang="ko-KR" sz="1400" dirty="0"/>
+              <a:t>templates</a:t>
+            </a:r>
+            <a:r>
+              <a:rPr lang="ko-KR" altLang="en-US" sz="1400" dirty="0"/>
+              <a:t>는 </a:t>
+            </a:r>
+            <a:r>
+              <a:rPr lang="en-US" altLang="ko-KR" sz="1400" dirty="0"/>
+              <a:t>HTML</a:t>
+            </a:r>
+            <a:r>
+              <a:rPr lang="ko-KR" altLang="en-US" sz="1400" dirty="0"/>
+              <a:t>로 </a:t>
+            </a:r>
+            <a:r>
+              <a:rPr lang="en-US" altLang="ko-KR" sz="1400" dirty="0"/>
+              <a:t>rendering </a:t>
+            </a:r>
+            <a:r>
+              <a:rPr lang="ko-KR" altLang="en-US" sz="1400" dirty="0"/>
+              <a:t>이 된다</a:t>
+            </a:r>
+            <a:r>
+              <a:rPr lang="en-US" altLang="ko-KR" sz="1400" dirty="0"/>
+              <a:t>.</a:t>
+            </a:r>
+          </a:p>
+          <a:p>
+            <a:pPr marL="285750" indent="-285750">
+              <a:buFontTx/>
+              <a:buChar char="-"/>
+            </a:pPr>
+            <a:endParaRPr lang="en-US" altLang="ko-KR" sz="1400" dirty="0"/>
+          </a:p>
+          <a:p>
+            <a:pPr marL="285750" indent="-285750">
+              <a:buFontTx/>
+              <a:buChar char="-"/>
+            </a:pPr>
+            <a:r>
+              <a:rPr lang="en-US" altLang="ko-KR" sz="1400" dirty="0"/>
+              <a:t>View </a:t>
+            </a:r>
+            <a:r>
+              <a:rPr lang="ko-KR" altLang="en-US" sz="1400" dirty="0"/>
+              <a:t>함수는 </a:t>
+            </a:r>
+            <a:r>
+              <a:rPr lang="en-US" altLang="ko-KR" sz="1400" dirty="0" err="1"/>
+              <a:t>NameForm</a:t>
+            </a:r>
+            <a:r>
+              <a:rPr lang="en-US" altLang="ko-KR" sz="1400" dirty="0"/>
+              <a:t> </a:t>
+            </a:r>
+            <a:r>
+              <a:rPr lang="ko-KR" altLang="en-US" sz="1400" dirty="0"/>
+              <a:t>인스턴스를 </a:t>
+            </a:r>
+            <a:r>
+              <a:rPr lang="en-US" altLang="ko-KR" sz="1400" dirty="0"/>
+              <a:t>form </a:t>
+            </a:r>
+            <a:r>
+              <a:rPr lang="ko-KR" altLang="en-US" sz="1400" dirty="0"/>
+              <a:t>이라는 이름을 갖는 인수로서 템플릿에 전달하여 </a:t>
+            </a:r>
+            <a:r>
+              <a:rPr lang="en-US" altLang="ko-KR" sz="1400" dirty="0"/>
+              <a:t>HTML form</a:t>
+            </a:r>
+            <a:r>
+              <a:rPr lang="ko-KR" altLang="en-US" sz="1400" dirty="0"/>
+              <a:t>을 생성</a:t>
+            </a:r>
+            <a:endParaRPr lang="en-US" altLang="ko-KR" sz="1400" dirty="0"/>
+          </a:p>
+          <a:p>
+            <a:pPr marL="285750" indent="-285750">
+              <a:buFontTx/>
+              <a:buChar char="-"/>
+            </a:pPr>
+            <a:endParaRPr lang="en-US" altLang="ko-KR" sz="1400" dirty="0"/>
+          </a:p>
+          <a:p>
+            <a:pPr marL="285750" indent="-285750">
+              <a:buFontTx/>
+              <a:buChar char="-"/>
+            </a:pPr>
+            <a:r>
+              <a:rPr lang="en-US" altLang="ko-KR" sz="1400" dirty="0"/>
+              <a:t>Id</a:t>
+            </a:r>
+            <a:r>
+              <a:rPr lang="ko-KR" altLang="en-US" sz="1400" dirty="0"/>
+              <a:t> 필드나 </a:t>
+            </a:r>
+            <a:r>
+              <a:rPr lang="en-US" altLang="ko-KR" sz="1400" dirty="0"/>
+              <a:t>class </a:t>
+            </a:r>
+            <a:r>
+              <a:rPr lang="ko-KR" altLang="en-US" sz="1400" dirty="0"/>
+              <a:t>속성을 주게 되면 </a:t>
+            </a:r>
+            <a:r>
+              <a:rPr lang="en-US" altLang="ko-KR" sz="1400" dirty="0"/>
+              <a:t>CSS </a:t>
+            </a:r>
+            <a:r>
+              <a:rPr lang="ko-KR" altLang="en-US" sz="1400" dirty="0"/>
+              <a:t>스타일의 정의할 수 있다</a:t>
+            </a:r>
+            <a:r>
+              <a:rPr lang="en-US" altLang="ko-KR" sz="1400" dirty="0"/>
+              <a:t>.</a:t>
+            </a:r>
+          </a:p>
+          <a:p>
+            <a:pPr marL="285750" indent="-285750">
+              <a:buFontTx/>
+              <a:buChar char="-"/>
+            </a:pPr>
+            <a:endParaRPr lang="en-US" altLang="ko-KR" sz="1400" dirty="0"/>
+          </a:p>
+          <a:p>
+            <a:pPr marL="285750" indent="-285750">
+              <a:buFontTx/>
+              <a:buChar char="-"/>
+            </a:pPr>
+            <a:r>
+              <a:rPr lang="en-US" altLang="ko-KR" sz="1400" dirty="0"/>
+              <a:t>Flask-Bootstrap</a:t>
+            </a:r>
+            <a:r>
+              <a:rPr lang="ko-KR" altLang="en-US" sz="1400" dirty="0"/>
+              <a:t>은 전체 </a:t>
+            </a:r>
+            <a:r>
+              <a:rPr lang="en-US" altLang="ko-KR" sz="1400" dirty="0"/>
+              <a:t>Flask-WTF form</a:t>
+            </a:r>
+            <a:r>
+              <a:rPr lang="ko-KR" altLang="en-US" sz="1400" dirty="0"/>
+              <a:t>을 렌더링 하기 위해 미리 정의된 폼 스타일을 사용하도록 하는 상위 레벨의 </a:t>
+            </a:r>
+            <a:r>
+              <a:rPr lang="ko-KR" altLang="en-US" sz="1400" dirty="0" err="1"/>
+              <a:t>헬퍼</a:t>
+            </a:r>
+            <a:r>
+              <a:rPr lang="ko-KR" altLang="en-US" sz="1400" dirty="0"/>
+              <a:t> 함수를 제공</a:t>
+            </a:r>
+            <a:endParaRPr lang="en-US" altLang="ko-KR" sz="1400" dirty="0"/>
+          </a:p>
+          <a:p>
+            <a:pPr marL="285750" indent="-285750">
+              <a:buFontTx/>
+              <a:buChar char="-"/>
+            </a:pPr>
+            <a:r>
+              <a:rPr lang="ko-KR" altLang="en-US" sz="1400" dirty="0"/>
+              <a:t>이 모든 것이 한 번의 호출로 이루어짐</a:t>
+            </a:r>
+            <a:endParaRPr lang="en-US" altLang="ko-KR" sz="1400" dirty="0"/>
+          </a:p>
+          <a:p>
+            <a:pPr marL="285750" indent="-285750">
+              <a:buFontTx/>
+              <a:buChar char="-"/>
+            </a:pPr>
+            <a:endParaRPr lang="en-US" altLang="ko-KR" sz="1400" dirty="0"/>
+          </a:p>
+          <a:p>
+            <a:pPr marL="285750" indent="-285750">
+              <a:buFontTx/>
+              <a:buChar char="-"/>
+            </a:pPr>
+            <a:r>
+              <a:rPr lang="en-US" altLang="ko-KR" sz="1400" dirty="0"/>
+              <a:t>Import</a:t>
+            </a:r>
+            <a:r>
+              <a:rPr lang="ko-KR" altLang="en-US" sz="1400" dirty="0"/>
+              <a:t> 는 템플릿 </a:t>
+            </a:r>
+            <a:r>
+              <a:rPr lang="ko-KR" altLang="en-US" sz="1400" dirty="0" err="1"/>
+              <a:t>엘리먼트가</a:t>
+            </a:r>
+            <a:r>
+              <a:rPr lang="ko-KR" altLang="en-US" sz="1400" dirty="0"/>
+              <a:t> </a:t>
+            </a:r>
+            <a:r>
+              <a:rPr lang="en-US" altLang="ko-KR" sz="1400" dirty="0"/>
+              <a:t>import </a:t>
+            </a:r>
+            <a:r>
+              <a:rPr lang="ko-KR" altLang="en-US" sz="1400" dirty="0"/>
+              <a:t>되고 다른 템플릿에서 사용되도록 함</a:t>
+            </a:r>
+            <a:r>
+              <a:rPr lang="en-US" altLang="ko-KR" sz="1400" dirty="0"/>
+              <a:t>.</a:t>
+            </a:r>
+          </a:p>
+          <a:p>
+            <a:pPr marL="285750" indent="-285750">
+              <a:buFontTx/>
+              <a:buChar char="-"/>
+            </a:pPr>
+            <a:r>
+              <a:rPr lang="ko-KR" altLang="en-US" sz="1400" dirty="0" err="1"/>
+              <a:t>임포트된</a:t>
+            </a:r>
+            <a:r>
+              <a:rPr lang="ko-KR" altLang="en-US" sz="1400" dirty="0"/>
+              <a:t> </a:t>
+            </a:r>
+            <a:r>
+              <a:rPr lang="en-US" altLang="ko-KR" sz="1400" dirty="0"/>
+              <a:t>bootstrap/wtf.html </a:t>
+            </a:r>
+            <a:r>
+              <a:rPr lang="ko-KR" altLang="en-US" sz="1400" dirty="0"/>
+              <a:t>파일은 부트스트랩을 사용하여 </a:t>
+            </a:r>
+            <a:r>
+              <a:rPr lang="en-US" altLang="ko-KR" sz="1400" dirty="0"/>
+              <a:t>Flask-WTF </a:t>
+            </a:r>
+            <a:r>
+              <a:rPr lang="ko-KR" altLang="en-US" sz="1400" dirty="0"/>
+              <a:t>폼을 렌더링하도록 하는 </a:t>
+            </a:r>
+            <a:r>
+              <a:rPr lang="ko-KR" altLang="en-US" sz="1400" dirty="0" err="1"/>
+              <a:t>헬퍼</a:t>
+            </a:r>
+            <a:r>
+              <a:rPr lang="ko-KR" altLang="en-US" sz="1400" dirty="0"/>
+              <a:t> 함수를 정의</a:t>
+            </a:r>
+            <a:endParaRPr lang="en-US" altLang="ko-KR" sz="1400" dirty="0"/>
+          </a:p>
+        </p:txBody>
+      </p:sp>
+      <p:pic>
+        <p:nvPicPr>
+          <p:cNvPr id="5" name="그림 4">
+            <a:extLst>
+              <a:ext uri="{FF2B5EF4-FFF2-40B4-BE49-F238E27FC236}">
+                <a16:creationId xmlns:a16="http://schemas.microsoft.com/office/drawing/2014/main" id="{AFD96B19-A014-4699-9AAA-11108FE929D5}"/>
+              </a:ext>
+            </a:extLst>
+          </p:cNvPr>
+          <p:cNvPicPr>
+            <a:picLocks noChangeAspect="1"/>
+          </p:cNvPicPr>
+          <p:nvPr/>
+        </p:nvPicPr>
+        <p:blipFill>
+          <a:blip r:embed="rId2"/>
+          <a:stretch>
+            <a:fillRect/>
+          </a:stretch>
+        </p:blipFill>
+        <p:spPr>
+          <a:xfrm>
+            <a:off x="1458430" y="1895261"/>
+            <a:ext cx="3658111" cy="1533739"/>
+          </a:xfrm>
+          <a:prstGeom prst="rect">
+            <a:avLst/>
+          </a:prstGeom>
+        </p:spPr>
+      </p:pic>
+      <p:pic>
+        <p:nvPicPr>
+          <p:cNvPr id="7" name="그림 6">
+            <a:extLst>
+              <a:ext uri="{FF2B5EF4-FFF2-40B4-BE49-F238E27FC236}">
+                <a16:creationId xmlns:a16="http://schemas.microsoft.com/office/drawing/2014/main" id="{8E737507-A452-4255-9722-C4B708DCA86D}"/>
+              </a:ext>
+            </a:extLst>
+          </p:cNvPr>
+          <p:cNvPicPr>
+            <a:picLocks noChangeAspect="1"/>
+          </p:cNvPicPr>
+          <p:nvPr/>
+        </p:nvPicPr>
+        <p:blipFill>
+          <a:blip r:embed="rId3"/>
+          <a:stretch>
+            <a:fillRect/>
+          </a:stretch>
+        </p:blipFill>
+        <p:spPr>
+          <a:xfrm>
+            <a:off x="1458430" y="3466780"/>
+            <a:ext cx="5297380" cy="1533738"/>
+          </a:xfrm>
+          <a:prstGeom prst="rect">
+            <a:avLst/>
+          </a:prstGeom>
+        </p:spPr>
+      </p:pic>
+      <p:pic>
+        <p:nvPicPr>
+          <p:cNvPr id="8" name="그림 7">
+            <a:extLst>
+              <a:ext uri="{FF2B5EF4-FFF2-40B4-BE49-F238E27FC236}">
+                <a16:creationId xmlns:a16="http://schemas.microsoft.com/office/drawing/2014/main" id="{68174E61-0332-41AB-9D8C-7EE9739497D9}"/>
+              </a:ext>
+            </a:extLst>
+          </p:cNvPr>
+          <p:cNvPicPr>
+            <a:picLocks noChangeAspect="1"/>
+          </p:cNvPicPr>
+          <p:nvPr/>
+        </p:nvPicPr>
+        <p:blipFill>
+          <a:blip r:embed="rId4"/>
+          <a:stretch>
+            <a:fillRect/>
+          </a:stretch>
+        </p:blipFill>
+        <p:spPr>
+          <a:xfrm>
+            <a:off x="1458430" y="5295767"/>
+            <a:ext cx="4261175" cy="1121362"/>
+          </a:xfrm>
+          <a:prstGeom prst="rect">
+            <a:avLst/>
+          </a:prstGeom>
+        </p:spPr>
+      </p:pic>
+    </p:spTree>
+    <p:extLst>
+      <p:ext uri="{BB962C8B-B14F-4D97-AF65-F5344CB8AC3E}">
+        <p14:creationId xmlns:p14="http://schemas.microsoft.com/office/powerpoint/2010/main" val="734824461"/>
+      </p:ext>
+    </p:extLst>
+  </p:cSld>
+  <p:clrMapOvr>
+    <a:masterClrMapping/>
+  </p:clrMapOvr>
+</p:sld>
+</file>
+
+<file path=ppt/slides/slide9.xml><?xml version="1.0" encoding="utf-8"?>
+<p:sld xmlns:a="http://schemas.openxmlformats.org/drawingml/2006/main" xmlns:r="http://schemas.openxmlformats.org/officeDocument/2006/relationships" xmlns:p="http://schemas.openxmlformats.org/presentationml/2006/main">
+  <p:cSld>
+    <p:spTree>
+      <p:nvGrpSpPr>
+        <p:cNvPr id="1" name=""/>
+        <p:cNvGrpSpPr/>
+        <p:nvPr/>
+      </p:nvGrpSpPr>
+      <p:grpSpPr>
+        <a:xfrm>
+          <a:off x="0" y="0"/>
+          <a:ext cx="0" cy="0"/>
+          <a:chOff x="0" y="0"/>
+          <a:chExt cx="0" cy="0"/>
+        </a:xfrm>
+      </p:grpSpPr>
+      <p:sp>
+        <p:nvSpPr>
+          <p:cNvPr id="2" name="제목 1">
+            <a:extLst>
+              <a:ext uri="{FF2B5EF4-FFF2-40B4-BE49-F238E27FC236}">
+                <a16:creationId xmlns:a16="http://schemas.microsoft.com/office/drawing/2014/main" id="{2EC833C6-FAC3-442B-803D-3FB02DF07980}"/>
+              </a:ext>
+            </a:extLst>
+          </p:cNvPr>
+          <p:cNvSpPr>
+            <a:spLocks noGrp="1"/>
+          </p:cNvSpPr>
+          <p:nvPr>
+            <p:ph type="title"/>
+          </p:nvPr>
+        </p:nvSpPr>
+        <p:spPr>
+          <a:xfrm>
+            <a:off x="677334" y="609600"/>
+            <a:ext cx="8596668" cy="517864"/>
+          </a:xfrm>
+        </p:spPr>
+        <p:txBody>
+          <a:bodyPr>
+            <a:normAutofit fontScale="90000"/>
+          </a:bodyPr>
+          <a:lstStyle/>
+          <a:p>
+            <a:r>
+              <a:rPr lang="en-US" altLang="ko-KR" dirty="0"/>
+              <a:t>3. Forms and User Input</a:t>
+            </a:r>
+            <a:endParaRPr lang="ko-KR" altLang="en-US" dirty="0"/>
+          </a:p>
+        </p:txBody>
+      </p:sp>
+      <p:sp>
+        <p:nvSpPr>
+          <p:cNvPr id="4" name="제목 1">
+            <a:extLst>
+              <a:ext uri="{FF2B5EF4-FFF2-40B4-BE49-F238E27FC236}">
+                <a16:creationId xmlns:a16="http://schemas.microsoft.com/office/drawing/2014/main" id="{824331F3-9831-4A24-AC95-4771B0BCE333}"/>
+              </a:ext>
+            </a:extLst>
+          </p:cNvPr>
+          <p:cNvSpPr txBox="1">
+            <a:spLocks/>
+          </p:cNvSpPr>
+          <p:nvPr/>
+        </p:nvSpPr>
+        <p:spPr>
+          <a:xfrm>
+            <a:off x="1307647" y="1180730"/>
+            <a:ext cx="8022783" cy="436518"/>
+          </a:xfrm>
+          <a:prstGeom prst="rect">
+            <a:avLst/>
+          </a:prstGeom>
+        </p:spPr>
+        <p:txBody>
+          <a:bodyPr vert="horz" lIns="91440" tIns="45720" rIns="91440" bIns="45720" rtlCol="0" anchor="t">
+            <a:normAutofit lnSpcReduction="10000"/>
+          </a:bodyPr>
+          <a:lstStyle>
+            <a:lvl1pPr algn="l" defTabSz="457200" rtl="0" eaLnBrk="1" latinLnBrk="1" hangingPunct="1">
+              <a:spcBef>
+                <a:spcPct val="0"/>
+              </a:spcBef>
+              <a:buNone/>
+              <a:defRPr sz="3600" kern="1200">
+                <a:solidFill>
+                  <a:schemeClr val="accent1"/>
+                </a:solidFill>
+                <a:latin typeface="+mj-lt"/>
+                <a:ea typeface="+mj-ea"/>
+                <a:cs typeface="+mj-cs"/>
+              </a:defRPr>
+            </a:lvl1pPr>
+            <a:lvl2pPr eaLnBrk="1" latinLnBrk="1" hangingPunct="1">
+              <a:defRPr>
+                <a:solidFill>
+                  <a:schemeClr val="tx2"/>
+                </a:solidFill>
+              </a:defRPr>
+            </a:lvl2pPr>
+            <a:lvl3pPr eaLnBrk="1" latinLnBrk="1" hangingPunct="1">
+              <a:defRPr>
+                <a:solidFill>
+                  <a:schemeClr val="tx2"/>
+                </a:solidFill>
+              </a:defRPr>
+            </a:lvl3pPr>
+            <a:lvl4pPr eaLnBrk="1" latinLnBrk="1" hangingPunct="1">
+              <a:defRPr>
+                <a:solidFill>
+                  <a:schemeClr val="tx2"/>
+                </a:solidFill>
+              </a:defRPr>
+            </a:lvl4pPr>
+            <a:lvl5pPr eaLnBrk="1" latinLnBrk="1" hangingPunct="1">
+              <a:defRPr>
+                <a:solidFill>
+                  <a:schemeClr val="tx2"/>
+                </a:solidFill>
+              </a:defRPr>
+            </a:lvl5pPr>
+            <a:lvl6pPr eaLnBrk="1" latinLnBrk="1" hangingPunct="1">
+              <a:defRPr>
+                <a:solidFill>
+                  <a:schemeClr val="tx2"/>
+                </a:solidFill>
+              </a:defRPr>
+            </a:lvl6pPr>
+            <a:lvl7pPr eaLnBrk="1" latinLnBrk="1" hangingPunct="1">
+              <a:defRPr>
+                <a:solidFill>
+                  <a:schemeClr val="tx2"/>
+                </a:solidFill>
+              </a:defRPr>
+            </a:lvl7pPr>
+            <a:lvl8pPr eaLnBrk="1" latinLnBrk="1" hangingPunct="1">
+              <a:defRPr>
+                <a:solidFill>
+                  <a:schemeClr val="tx2"/>
+                </a:solidFill>
+              </a:defRPr>
+            </a:lvl8pPr>
+            <a:lvl9pPr eaLnBrk="1" latinLnBrk="1" hangingPunct="1">
+              <a:defRPr>
+                <a:solidFill>
+                  <a:schemeClr val="tx2"/>
+                </a:solidFill>
+              </a:defRPr>
+            </a:lvl9pPr>
+          </a:lstStyle>
+          <a:p>
+            <a:r>
+              <a:rPr lang="en-US" altLang="ko-KR" sz="2400" dirty="0"/>
+              <a:t>HTML Rendering of Forms</a:t>
+            </a:r>
+          </a:p>
+        </p:txBody>
+      </p:sp>
+      <p:sp>
+        <p:nvSpPr>
+          <p:cNvPr id="6" name="직사각형 5">
+            <a:extLst>
+              <a:ext uri="{FF2B5EF4-FFF2-40B4-BE49-F238E27FC236}">
+                <a16:creationId xmlns:a16="http://schemas.microsoft.com/office/drawing/2014/main" id="{6A60F032-B172-43E0-B147-16329887DE8F}"/>
+              </a:ext>
+            </a:extLst>
+          </p:cNvPr>
+          <p:cNvSpPr/>
+          <p:nvPr/>
+        </p:nvSpPr>
+        <p:spPr>
+          <a:xfrm>
+            <a:off x="7620874" y="2196693"/>
+            <a:ext cx="4470512" cy="2462213"/>
+          </a:xfrm>
+          <a:prstGeom prst="rect">
+            <a:avLst/>
+          </a:prstGeom>
+        </p:spPr>
+        <p:txBody>
+          <a:bodyPr wrap="square">
+            <a:spAutoFit/>
+          </a:bodyPr>
+          <a:lstStyle/>
+          <a:p>
+            <a:pPr marL="285750" indent="-285750">
+              <a:buFontTx/>
+              <a:buChar char="-"/>
+            </a:pPr>
+            <a:r>
+              <a:rPr lang="en-US" altLang="ko-KR" sz="1400" dirty="0" err="1"/>
+              <a:t>Wtf.quick_form</a:t>
+            </a:r>
+            <a:r>
+              <a:rPr lang="en-US" altLang="ko-KR" sz="1400" dirty="0"/>
+              <a:t>() </a:t>
+            </a:r>
+            <a:r>
+              <a:rPr lang="ko-KR" altLang="en-US" sz="1400" dirty="0"/>
+              <a:t>함수는 </a:t>
+            </a:r>
+            <a:r>
+              <a:rPr lang="en-US" altLang="ko-KR" sz="1400" dirty="0"/>
+              <a:t>Flask-WTF </a:t>
+            </a:r>
+            <a:r>
+              <a:rPr lang="ko-KR" altLang="en-US" sz="1400" dirty="0"/>
+              <a:t>폼 오브젝트를 받아서 디폴트 부트스트랩 스타일을 </a:t>
+            </a:r>
+            <a:r>
+              <a:rPr lang="ko-KR" altLang="en-US" sz="1400" dirty="0" err="1"/>
+              <a:t>하용하여</a:t>
+            </a:r>
+            <a:r>
+              <a:rPr lang="ko-KR" altLang="en-US" sz="1400" dirty="0"/>
+              <a:t> 렌더링함</a:t>
+            </a:r>
+            <a:endParaRPr lang="en-US" altLang="ko-KR" sz="1400" dirty="0"/>
+          </a:p>
+          <a:p>
+            <a:pPr marL="285750" indent="-285750">
+              <a:buFontTx/>
+              <a:buChar char="-"/>
+            </a:pPr>
+            <a:endParaRPr lang="en-US" altLang="ko-KR" sz="1400" dirty="0"/>
+          </a:p>
+          <a:p>
+            <a:pPr marL="285750" indent="-285750">
+              <a:buFontTx/>
+              <a:buChar char="-"/>
+            </a:pPr>
+            <a:r>
+              <a:rPr lang="ko-KR" altLang="en-US" sz="1400" dirty="0"/>
+              <a:t>템플릿 컨텐츠 영역은 </a:t>
+            </a:r>
+            <a:r>
+              <a:rPr lang="en-US" altLang="ko-KR" sz="1400" dirty="0"/>
+              <a:t>2</a:t>
+            </a:r>
+            <a:r>
+              <a:rPr lang="ko-KR" altLang="en-US" sz="1400" dirty="0"/>
+              <a:t>개의 </a:t>
+            </a:r>
+            <a:r>
+              <a:rPr lang="ko-KR" altLang="en-US" sz="1400" dirty="0" err="1"/>
+              <a:t>섹션으로</a:t>
+            </a:r>
+            <a:r>
+              <a:rPr lang="ko-KR" altLang="en-US" sz="1400" dirty="0"/>
+              <a:t> 나뉘고</a:t>
+            </a:r>
+            <a:endParaRPr lang="en-US" altLang="ko-KR" sz="1400" dirty="0"/>
+          </a:p>
+          <a:p>
+            <a:pPr marL="285750" indent="-285750">
+              <a:buFontTx/>
+              <a:buChar char="-"/>
+            </a:pPr>
+            <a:r>
+              <a:rPr lang="ko-KR" altLang="en-US" sz="1400" dirty="0"/>
+              <a:t>첫 번째는 페이지의 </a:t>
+            </a:r>
+            <a:r>
+              <a:rPr lang="en-US" altLang="ko-KR" sz="1400" dirty="0"/>
+              <a:t>header</a:t>
+            </a:r>
+          </a:p>
+          <a:p>
+            <a:pPr marL="285750" indent="-285750">
+              <a:buFontTx/>
+              <a:buChar char="-"/>
+            </a:pPr>
+            <a:r>
+              <a:rPr lang="en-US" altLang="ko-KR" sz="1400" dirty="0"/>
+              <a:t>Hello</a:t>
+            </a:r>
+            <a:r>
+              <a:rPr lang="ko-KR" altLang="en-US" sz="1400" dirty="0"/>
+              <a:t>를 출력하고 </a:t>
+            </a:r>
+            <a:r>
+              <a:rPr lang="en-US" altLang="ko-KR" sz="1400" dirty="0"/>
+              <a:t>name</a:t>
+            </a:r>
+            <a:r>
+              <a:rPr lang="ko-KR" altLang="en-US" sz="1400" dirty="0"/>
+              <a:t>이 정의 되어있지 않으면 </a:t>
+            </a:r>
+            <a:r>
+              <a:rPr lang="en-US" altLang="ko-KR" sz="1400" dirty="0"/>
+              <a:t>Stranger! </a:t>
+            </a:r>
+            <a:r>
+              <a:rPr lang="ko-KR" altLang="en-US" sz="1400" dirty="0"/>
+              <a:t>를 출력</a:t>
+            </a:r>
+            <a:endParaRPr lang="en-US" altLang="ko-KR" sz="1400" dirty="0"/>
+          </a:p>
+          <a:p>
+            <a:pPr marL="285750" indent="-285750">
+              <a:buFontTx/>
+              <a:buChar char="-"/>
+            </a:pPr>
+            <a:endParaRPr lang="en-US" altLang="ko-KR" sz="1400" dirty="0"/>
+          </a:p>
+          <a:p>
+            <a:pPr marL="285750" indent="-285750">
+              <a:buFontTx/>
+              <a:buChar char="-"/>
+            </a:pPr>
+            <a:r>
+              <a:rPr lang="ko-KR" altLang="en-US" sz="1400" dirty="0"/>
+              <a:t>두번째 컨텐츠는 </a:t>
+            </a:r>
+            <a:r>
+              <a:rPr lang="en-US" altLang="ko-KR" sz="1400" dirty="0" err="1"/>
+              <a:t>wtf.quick_form</a:t>
+            </a:r>
+            <a:r>
+              <a:rPr lang="en-US" altLang="ko-KR" sz="1400" dirty="0"/>
+              <a:t>() </a:t>
+            </a:r>
+            <a:r>
+              <a:rPr lang="ko-KR" altLang="en-US" sz="1400" dirty="0"/>
+              <a:t>함수를 사용하여 </a:t>
+            </a:r>
+            <a:r>
+              <a:rPr lang="en-US" altLang="ko-KR" sz="1400" dirty="0" err="1"/>
+              <a:t>NameForm</a:t>
+            </a:r>
+            <a:r>
+              <a:rPr lang="en-US" altLang="ko-KR" sz="1400" dirty="0"/>
+              <a:t> </a:t>
+            </a:r>
+            <a:r>
+              <a:rPr lang="ko-KR" altLang="en-US" sz="1400" dirty="0"/>
+              <a:t>오브젝트를 렌더링함</a:t>
+            </a:r>
+            <a:endParaRPr lang="en-US" altLang="ko-KR" sz="1400" dirty="0"/>
+          </a:p>
+        </p:txBody>
+      </p:sp>
+      <p:pic>
+        <p:nvPicPr>
+          <p:cNvPr id="3" name="그림 2">
+            <a:extLst>
+              <a:ext uri="{FF2B5EF4-FFF2-40B4-BE49-F238E27FC236}">
+                <a16:creationId xmlns:a16="http://schemas.microsoft.com/office/drawing/2014/main" id="{B031A426-D854-4FDF-95ED-1B3683568388}"/>
+              </a:ext>
+            </a:extLst>
+          </p:cNvPr>
+          <p:cNvPicPr>
+            <a:picLocks noChangeAspect="1"/>
+          </p:cNvPicPr>
+          <p:nvPr/>
+        </p:nvPicPr>
+        <p:blipFill>
+          <a:blip r:embed="rId2"/>
+          <a:stretch>
+            <a:fillRect/>
+          </a:stretch>
+        </p:blipFill>
+        <p:spPr>
+          <a:xfrm>
+            <a:off x="271081" y="2231768"/>
+            <a:ext cx="6997371" cy="3882020"/>
+          </a:xfrm>
+          <a:prstGeom prst="rect">
+            <a:avLst/>
+          </a:prstGeom>
+        </p:spPr>
+      </p:pic>
+    </p:spTree>
+    <p:extLst>
+      <p:ext uri="{BB962C8B-B14F-4D97-AF65-F5344CB8AC3E}">
+        <p14:creationId xmlns:p14="http://schemas.microsoft.com/office/powerpoint/2010/main" val="2342272785"/>
       </p:ext>
     </p:extLst>
   </p:cSld>

</xml_diff>